<commit_message>
added architecture and prototype to powerpoint
</commit_message>
<xml_diff>
--- a/MannschaftPresentation.pptx
+++ b/MannschaftPresentation.pptx
@@ -13,8 +13,10 @@
     <p:sldId id="261" r:id="rId7"/>
     <p:sldId id="264" r:id="rId8"/>
     <p:sldId id="269" r:id="rId9"/>
-    <p:sldId id="270" r:id="rId10"/>
-    <p:sldId id="271" r:id="rId11"/>
+    <p:sldId id="272" r:id="rId10"/>
+    <p:sldId id="273" r:id="rId11"/>
+    <p:sldId id="274" r:id="rId12"/>
+    <p:sldId id="270" r:id="rId13"/>
   </p:sldIdLst>
   <p:sldSz cx="12192000" cy="6858000"/>
   <p:notesSz cx="6858000" cy="9144000"/>
@@ -13308,25 +13310,6 @@
           </a:p>
         </p:txBody>
       </p:sp>
-      <p:sp>
-        <p:nvSpPr>
-          <p:cNvPr id="3" name="Content Placeholder 2"/>
-          <p:cNvSpPr>
-            <a:spLocks noGrp="1"/>
-          </p:cNvSpPr>
-          <p:nvPr>
-            <p:ph idx="1"/>
-          </p:nvPr>
-        </p:nvSpPr>
-        <p:spPr/>
-        <p:txBody>
-          <a:bodyPr/>
-          <a:lstStyle/>
-          <a:p>
-            <a:endParaRPr lang="en-US"/>
-          </a:p>
-        </p:txBody>
-      </p:sp>
       <p:pic>
         <p:nvPicPr>
           <p:cNvPr id="4" name="Picture 3" descr="C:\Users\Cyril\AppData\Local\Microsoft\Windows\INetCache\Content.Word\knust-logo-540x540.jpg"/>
@@ -13348,8 +13331,8 @@
         </p:blipFill>
         <p:spPr bwMode="auto">
           <a:xfrm>
-            <a:off x="2197100" y="1825625"/>
-            <a:ext cx="7543800" cy="4351338"/>
+            <a:off x="2197100" y="2490651"/>
+            <a:ext cx="7543800" cy="3686312"/>
           </a:xfrm>
           <a:prstGeom prst="rect">
             <a:avLst/>
@@ -13406,16 +13389,390 @@
           <a:lstStyle/>
           <a:p>
             <a:r>
-              <a:rPr lang="en-US" dirty="0" smtClean="0"/>
-              <a:t>Tentative timeline</a:t>
-            </a:r>
-            <a:endParaRPr lang="en-US" dirty="0"/>
+              <a:rPr lang="en-US" b="1" dirty="0"/>
+              <a:t>Architecture and Functionality</a:t>
+            </a:r>
+            <a:endParaRPr lang="en-GB" dirty="0"/>
           </a:p>
         </p:txBody>
       </p:sp>
       <p:sp>
         <p:nvSpPr>
-          <p:cNvPr id="3" name="Content Placeholder 2"/>
+          <p:cNvPr id="10" name="Rectangle 9"/>
+          <p:cNvSpPr/>
+          <p:nvPr/>
+        </p:nvSpPr>
+        <p:spPr>
+          <a:xfrm>
+            <a:off x="780216" y="2251584"/>
+            <a:ext cx="1268296" cy="369332"/>
+          </a:xfrm>
+          <a:prstGeom prst="rect">
+            <a:avLst/>
+          </a:prstGeom>
+        </p:spPr>
+        <p:txBody>
+          <a:bodyPr wrap="none">
+            <a:spAutoFit/>
+          </a:bodyPr>
+          <a:lstStyle/>
+          <a:p>
+            <a:r>
+              <a:rPr lang="en-GB" dirty="0" smtClean="0"/>
+              <a:t>Instructor:</a:t>
+            </a:r>
+            <a:endParaRPr lang="en-GB" dirty="0"/>
+          </a:p>
+        </p:txBody>
+      </p:sp>
+      <p:pic>
+        <p:nvPicPr>
+          <p:cNvPr id="3" name="Picture 2"/>
+          <p:cNvPicPr>
+            <a:picLocks noChangeAspect="1"/>
+          </p:cNvPicPr>
+          <p:nvPr/>
+        </p:nvPicPr>
+        <p:blipFill>
+          <a:blip r:embed="rId2">
+            <a:extLst>
+              <a:ext uri="{28A0092B-C50C-407E-A947-70E740481C1C}">
+                <a14:useLocalDpi xmlns:a14="http://schemas.microsoft.com/office/drawing/2010/main" val="0"/>
+              </a:ext>
+            </a:extLst>
+          </a:blip>
+          <a:stretch>
+            <a:fillRect/>
+          </a:stretch>
+        </p:blipFill>
+        <p:spPr>
+          <a:xfrm>
+            <a:off x="841176" y="2620916"/>
+            <a:ext cx="1971693" cy="3416301"/>
+          </a:xfrm>
+          <a:prstGeom prst="rect">
+            <a:avLst/>
+          </a:prstGeom>
+        </p:spPr>
+      </p:pic>
+      <p:pic>
+        <p:nvPicPr>
+          <p:cNvPr id="6" name="Picture 5"/>
+          <p:cNvPicPr>
+            <a:picLocks noChangeAspect="1"/>
+          </p:cNvPicPr>
+          <p:nvPr/>
+        </p:nvPicPr>
+        <p:blipFill>
+          <a:blip r:embed="rId3">
+            <a:extLst>
+              <a:ext uri="{28A0092B-C50C-407E-A947-70E740481C1C}">
+                <a14:useLocalDpi xmlns:a14="http://schemas.microsoft.com/office/drawing/2010/main" val="0"/>
+              </a:ext>
+            </a:extLst>
+          </a:blip>
+          <a:stretch>
+            <a:fillRect/>
+          </a:stretch>
+        </p:blipFill>
+        <p:spPr>
+          <a:xfrm>
+            <a:off x="2873830" y="2620916"/>
+            <a:ext cx="1910498" cy="3396441"/>
+          </a:xfrm>
+          <a:prstGeom prst="rect">
+            <a:avLst/>
+          </a:prstGeom>
+        </p:spPr>
+      </p:pic>
+    </p:spTree>
+    <p:extLst>
+      <p:ext uri="{BB962C8B-B14F-4D97-AF65-F5344CB8AC3E}">
+        <p14:creationId xmlns:p14="http://schemas.microsoft.com/office/powerpoint/2010/main" val="1965834016"/>
+      </p:ext>
+    </p:extLst>
+  </p:cSld>
+  <p:clrMapOvr>
+    <a:masterClrMapping/>
+  </p:clrMapOvr>
+</p:sld>
+</file>
+
+<file path=ppt/slides/slide11.xml><?xml version="1.0" encoding="utf-8"?>
+<p:sld xmlns:a="http://schemas.openxmlformats.org/drawingml/2006/main" xmlns:r="http://schemas.openxmlformats.org/officeDocument/2006/relationships" xmlns:p="http://schemas.openxmlformats.org/presentationml/2006/main">
+  <p:cSld>
+    <p:spTree>
+      <p:nvGrpSpPr>
+        <p:cNvPr id="1" name=""/>
+        <p:cNvGrpSpPr/>
+        <p:nvPr/>
+      </p:nvGrpSpPr>
+      <p:grpSpPr>
+        <a:xfrm>
+          <a:off x="0" y="0"/>
+          <a:ext cx="0" cy="0"/>
+          <a:chOff x="0" y="0"/>
+          <a:chExt cx="0" cy="0"/>
+        </a:xfrm>
+      </p:grpSpPr>
+      <p:sp>
+        <p:nvSpPr>
+          <p:cNvPr id="2" name="Title 1"/>
+          <p:cNvSpPr>
+            <a:spLocks noGrp="1"/>
+          </p:cNvSpPr>
+          <p:nvPr>
+            <p:ph type="title"/>
+          </p:nvPr>
+        </p:nvSpPr>
+        <p:spPr/>
+        <p:txBody>
+          <a:bodyPr/>
+          <a:lstStyle/>
+          <a:p>
+            <a:r>
+              <a:rPr lang="en-US" b="1" dirty="0"/>
+              <a:t>Architecture and Functionality</a:t>
+            </a:r>
+            <a:endParaRPr lang="en-GB" dirty="0"/>
+          </a:p>
+        </p:txBody>
+      </p:sp>
+      <p:sp>
+        <p:nvSpPr>
+          <p:cNvPr id="10" name="Rectangle 9"/>
+          <p:cNvSpPr/>
+          <p:nvPr/>
+        </p:nvSpPr>
+        <p:spPr>
+          <a:xfrm>
+            <a:off x="780216" y="2251584"/>
+            <a:ext cx="1202573" cy="369332"/>
+          </a:xfrm>
+          <a:prstGeom prst="rect">
+            <a:avLst/>
+          </a:prstGeom>
+        </p:spPr>
+        <p:txBody>
+          <a:bodyPr wrap="none">
+            <a:spAutoFit/>
+          </a:bodyPr>
+          <a:lstStyle/>
+          <a:p>
+            <a:r>
+              <a:rPr lang="en-GB" dirty="0" smtClean="0"/>
+              <a:t>Students:</a:t>
+            </a:r>
+            <a:endParaRPr lang="en-GB" dirty="0"/>
+          </a:p>
+        </p:txBody>
+      </p:sp>
+      <p:pic>
+        <p:nvPicPr>
+          <p:cNvPr id="4" name="Picture 3"/>
+          <p:cNvPicPr>
+            <a:picLocks noChangeAspect="1"/>
+          </p:cNvPicPr>
+          <p:nvPr/>
+        </p:nvPicPr>
+        <p:blipFill>
+          <a:blip r:embed="rId2">
+            <a:extLst>
+              <a:ext uri="{28A0092B-C50C-407E-A947-70E740481C1C}">
+                <a14:useLocalDpi xmlns:a14="http://schemas.microsoft.com/office/drawing/2010/main" val="0"/>
+              </a:ext>
+            </a:extLst>
+          </a:blip>
+          <a:stretch>
+            <a:fillRect/>
+          </a:stretch>
+        </p:blipFill>
+        <p:spPr>
+          <a:xfrm>
+            <a:off x="1066670" y="2620915"/>
+            <a:ext cx="1856648" cy="3396441"/>
+          </a:xfrm>
+          <a:prstGeom prst="rect">
+            <a:avLst/>
+          </a:prstGeom>
+        </p:spPr>
+      </p:pic>
+      <p:pic>
+        <p:nvPicPr>
+          <p:cNvPr id="5" name="Picture 4"/>
+          <p:cNvPicPr>
+            <a:picLocks noChangeAspect="1"/>
+          </p:cNvPicPr>
+          <p:nvPr/>
+        </p:nvPicPr>
+        <p:blipFill>
+          <a:blip r:embed="rId3">
+            <a:extLst>
+              <a:ext uri="{28A0092B-C50C-407E-A947-70E740481C1C}">
+                <a14:useLocalDpi xmlns:a14="http://schemas.microsoft.com/office/drawing/2010/main" val="0"/>
+              </a:ext>
+            </a:extLst>
+          </a:blip>
+          <a:stretch>
+            <a:fillRect/>
+          </a:stretch>
+        </p:blipFill>
+        <p:spPr>
+          <a:xfrm>
+            <a:off x="2985206" y="2620915"/>
+            <a:ext cx="1910498" cy="3396441"/>
+          </a:xfrm>
+          <a:prstGeom prst="rect">
+            <a:avLst/>
+          </a:prstGeom>
+        </p:spPr>
+      </p:pic>
+      <p:pic>
+        <p:nvPicPr>
+          <p:cNvPr id="7" name="Picture 6"/>
+          <p:cNvPicPr>
+            <a:picLocks noChangeAspect="1"/>
+          </p:cNvPicPr>
+          <p:nvPr/>
+        </p:nvPicPr>
+        <p:blipFill>
+          <a:blip r:embed="rId4">
+            <a:extLst>
+              <a:ext uri="{28A0092B-C50C-407E-A947-70E740481C1C}">
+                <a14:useLocalDpi xmlns:a14="http://schemas.microsoft.com/office/drawing/2010/main" val="0"/>
+              </a:ext>
+            </a:extLst>
+          </a:blip>
+          <a:stretch>
+            <a:fillRect/>
+          </a:stretch>
+        </p:blipFill>
+        <p:spPr>
+          <a:xfrm>
+            <a:off x="4957592" y="2620915"/>
+            <a:ext cx="1910498" cy="3396441"/>
+          </a:xfrm>
+          <a:prstGeom prst="rect">
+            <a:avLst/>
+          </a:prstGeom>
+        </p:spPr>
+      </p:pic>
+      <p:pic>
+        <p:nvPicPr>
+          <p:cNvPr id="8" name="Picture 7"/>
+          <p:cNvPicPr>
+            <a:picLocks noChangeAspect="1"/>
+          </p:cNvPicPr>
+          <p:nvPr/>
+        </p:nvPicPr>
+        <p:blipFill>
+          <a:blip r:embed="rId5">
+            <a:extLst>
+              <a:ext uri="{28A0092B-C50C-407E-A947-70E740481C1C}">
+                <a14:useLocalDpi xmlns:a14="http://schemas.microsoft.com/office/drawing/2010/main" val="0"/>
+              </a:ext>
+            </a:extLst>
+          </a:blip>
+          <a:stretch>
+            <a:fillRect/>
+          </a:stretch>
+        </p:blipFill>
+        <p:spPr>
+          <a:xfrm>
+            <a:off x="6929978" y="2620915"/>
+            <a:ext cx="1910498" cy="3396441"/>
+          </a:xfrm>
+          <a:prstGeom prst="rect">
+            <a:avLst/>
+          </a:prstGeom>
+        </p:spPr>
+      </p:pic>
+      <p:pic>
+        <p:nvPicPr>
+          <p:cNvPr id="11" name="Picture 10"/>
+          <p:cNvPicPr>
+            <a:picLocks noChangeAspect="1"/>
+          </p:cNvPicPr>
+          <p:nvPr/>
+        </p:nvPicPr>
+        <p:blipFill>
+          <a:blip r:embed="rId6">
+            <a:extLst>
+              <a:ext uri="{28A0092B-C50C-407E-A947-70E740481C1C}">
+                <a14:useLocalDpi xmlns:a14="http://schemas.microsoft.com/office/drawing/2010/main" val="0"/>
+              </a:ext>
+            </a:extLst>
+          </a:blip>
+          <a:stretch>
+            <a:fillRect/>
+          </a:stretch>
+        </p:blipFill>
+        <p:spPr>
+          <a:xfrm>
+            <a:off x="8902365" y="2620915"/>
+            <a:ext cx="1910498" cy="3396441"/>
+          </a:xfrm>
+          <a:prstGeom prst="rect">
+            <a:avLst/>
+          </a:prstGeom>
+        </p:spPr>
+      </p:pic>
+    </p:spTree>
+    <p:extLst>
+      <p:ext uri="{BB962C8B-B14F-4D97-AF65-F5344CB8AC3E}">
+        <p14:creationId xmlns:p14="http://schemas.microsoft.com/office/powerpoint/2010/main" val="1392712207"/>
+      </p:ext>
+    </p:extLst>
+  </p:cSld>
+  <p:clrMapOvr>
+    <a:masterClrMapping/>
+  </p:clrMapOvr>
+</p:sld>
+</file>
+
+<file path=ppt/slides/slide12.xml><?xml version="1.0" encoding="utf-8"?>
+<p:sld xmlns:a="http://schemas.openxmlformats.org/drawingml/2006/main" xmlns:r="http://schemas.openxmlformats.org/officeDocument/2006/relationships" xmlns:p="http://schemas.openxmlformats.org/presentationml/2006/main">
+  <p:cSld>
+    <p:spTree>
+      <p:nvGrpSpPr>
+        <p:cNvPr id="1" name=""/>
+        <p:cNvGrpSpPr/>
+        <p:nvPr/>
+      </p:nvGrpSpPr>
+      <p:grpSpPr>
+        <a:xfrm>
+          <a:off x="0" y="0"/>
+          <a:ext cx="0" cy="0"/>
+          <a:chOff x="0" y="0"/>
+          <a:chExt cx="0" cy="0"/>
+        </a:xfrm>
+      </p:grpSpPr>
+      <p:sp>
+        <p:nvSpPr>
+          <p:cNvPr id="2" name="Title 1"/>
+          <p:cNvSpPr>
+            <a:spLocks noGrp="1"/>
+          </p:cNvSpPr>
+          <p:nvPr>
+            <p:ph type="title"/>
+          </p:nvPr>
+        </p:nvSpPr>
+        <p:spPr/>
+        <p:txBody>
+          <a:bodyPr/>
+          <a:lstStyle/>
+          <a:p>
+            <a:r>
+              <a:rPr lang="en-US" dirty="0" smtClean="0"/>
+              <a:t>Desired outcome</a:t>
+            </a:r>
+            <a:endParaRPr lang="en-US" dirty="0"/>
+          </a:p>
+        </p:txBody>
+      </p:sp>
+      <p:sp>
+        <p:nvSpPr>
+          <p:cNvPr id="4" name="Content Placeholder 3"/>
           <p:cNvSpPr>
             <a:spLocks noGrp="1"/>
           </p:cNvSpPr>
@@ -13428,14 +13785,45 @@
           <a:bodyPr/>
           <a:lstStyle/>
           <a:p>
-            <a:endParaRPr lang="en-US"/>
+            <a:pPr marL="0" indent="0">
+              <a:buNone/>
+            </a:pPr>
+            <a:r>
+              <a:rPr lang="en-US" b="1" dirty="0" smtClean="0"/>
+              <a:t>We expect that:</a:t>
+            </a:r>
+          </a:p>
+          <a:p>
+            <a:r>
+              <a:rPr lang="en-US" dirty="0" smtClean="0"/>
+              <a:t>Communication between instructors and students is clear and noise free.</a:t>
+            </a:r>
+          </a:p>
+          <a:p>
+            <a:r>
+              <a:rPr lang="en-US" dirty="0" smtClean="0"/>
+              <a:t>Student thoughts on changes are taking into consideration.</a:t>
+            </a:r>
+          </a:p>
+          <a:p>
+            <a:r>
+              <a:rPr lang="en-US" dirty="0" smtClean="0"/>
+              <a:t>Class reschedules are carried out swiftly.</a:t>
+            </a:r>
+          </a:p>
+          <a:p>
+            <a:r>
+              <a:rPr lang="en-US" dirty="0" smtClean="0"/>
+              <a:t>Venue conflicts are resolved faster.</a:t>
+            </a:r>
+            <a:endParaRPr lang="en-US" dirty="0"/>
           </a:p>
         </p:txBody>
       </p:sp>
     </p:spTree>
     <p:extLst>
       <p:ext uri="{BB962C8B-B14F-4D97-AF65-F5344CB8AC3E}">
-        <p14:creationId xmlns:p14="http://schemas.microsoft.com/office/powerpoint/2010/main" val="865626473"/>
+        <p14:creationId xmlns:p14="http://schemas.microsoft.com/office/powerpoint/2010/main" val="1583502707"/>
       </p:ext>
     </p:extLst>
   </p:cSld>
@@ -13681,20 +14069,13 @@
           </a:p>
           <a:p>
             <a:r>
-              <a:rPr lang="en-US" dirty="0" smtClean="0"/>
-              <a:t>Desired outcome</a:t>
-            </a:r>
-          </a:p>
-          <a:p>
-            <a:r>
-              <a:rPr lang="en-US" dirty="0" smtClean="0"/>
-              <a:t>Tentative timeline</a:t>
-            </a:r>
-          </a:p>
-          <a:p>
-            <a:pPr marL="0" indent="0">
-              <a:buNone/>
-            </a:pPr>
+              <a:rPr lang="en-US" smtClean="0"/>
+              <a:t>Desired </a:t>
+            </a:r>
+            <a:r>
+              <a:rPr lang="en-US" smtClean="0"/>
+              <a:t>outcome</a:t>
+            </a:r>
             <a:endParaRPr lang="en-US" dirty="0" smtClean="0"/>
           </a:p>
           <a:p>
@@ -13984,7 +14365,15 @@
             </a:pPr>
             <a:r>
               <a:rPr lang="en-US" b="1" dirty="0" smtClean="0"/>
-              <a:t> An app to:</a:t>
+              <a:t> An app </a:t>
+            </a:r>
+            <a:r>
+              <a:rPr lang="en-US" b="1" dirty="0" smtClean="0"/>
+              <a:t>(Android, Web app) to</a:t>
+            </a:r>
+            <a:r>
+              <a:rPr lang="en-US" b="1" dirty="0" smtClean="0"/>
+              <a:t>:</a:t>
             </a:r>
           </a:p>
           <a:p>
@@ -14204,7 +14593,354 @@
           <a:bodyPr/>
           <a:lstStyle/>
           <a:p>
-            <a:endParaRPr lang="en-US"/>
+            <a:endParaRPr lang="en-US" dirty="0" smtClean="0"/>
+          </a:p>
+          <a:p>
+            <a:pPr marL="0" indent="0">
+              <a:buNone/>
+            </a:pPr>
+            <a:endParaRPr lang="en-US" dirty="0"/>
+          </a:p>
+        </p:txBody>
+      </p:sp>
+      <p:sp>
+        <p:nvSpPr>
+          <p:cNvPr id="6" name="Content Placeholder 3"/>
+          <p:cNvSpPr txBox="1">
+            <a:spLocks/>
+          </p:cNvSpPr>
+          <p:nvPr/>
+        </p:nvSpPr>
+        <p:spPr>
+          <a:xfrm>
+            <a:off x="1307354" y="2755900"/>
+            <a:ext cx="8825659" cy="3416300"/>
+          </a:xfrm>
+          <a:prstGeom prst="rect">
+            <a:avLst/>
+          </a:prstGeom>
+        </p:spPr>
+        <p:txBody>
+          <a:bodyPr vert="horz" lIns="91440" tIns="45720" rIns="91440" bIns="45720" rtlCol="0">
+            <a:normAutofit/>
+          </a:bodyPr>
+          <a:lstStyle>
+            <a:lvl1pPr marL="342900" indent="-342900" algn="l" defTabSz="457200" rtl="0" eaLnBrk="1" latinLnBrk="0" hangingPunct="1">
+              <a:spcBef>
+                <a:spcPts val="1000"/>
+              </a:spcBef>
+              <a:spcAft>
+                <a:spcPts val="0"/>
+              </a:spcAft>
+              <a:buClr>
+                <a:schemeClr val="accent1"/>
+              </a:buClr>
+              <a:buSzPct val="80000"/>
+              <a:buFont typeface="Wingdings 3" charset="2"/>
+              <a:buChar char=""/>
+              <a:defRPr sz="1800" b="0" i="0" kern="1200">
+                <a:solidFill>
+                  <a:schemeClr val="tx1">
+                    <a:lumMod val="75000"/>
+                    <a:lumOff val="25000"/>
+                  </a:schemeClr>
+                </a:solidFill>
+                <a:latin typeface="+mn-lt"/>
+                <a:ea typeface="+mn-ea"/>
+                <a:cs typeface="+mn-cs"/>
+              </a:defRPr>
+            </a:lvl1pPr>
+            <a:lvl2pPr marL="742950" indent="-285750" algn="l" defTabSz="457200" rtl="0" eaLnBrk="1" latinLnBrk="0" hangingPunct="1">
+              <a:spcBef>
+                <a:spcPts val="1000"/>
+              </a:spcBef>
+              <a:spcAft>
+                <a:spcPts val="0"/>
+              </a:spcAft>
+              <a:buClr>
+                <a:schemeClr val="accent1"/>
+              </a:buClr>
+              <a:buSzPct val="80000"/>
+              <a:buFont typeface="Wingdings 3" charset="2"/>
+              <a:buChar char=""/>
+              <a:defRPr sz="1600" b="0" i="0" kern="1200">
+                <a:solidFill>
+                  <a:schemeClr val="tx1">
+                    <a:lumMod val="75000"/>
+                    <a:lumOff val="25000"/>
+                  </a:schemeClr>
+                </a:solidFill>
+                <a:latin typeface="+mn-lt"/>
+                <a:ea typeface="+mn-ea"/>
+                <a:cs typeface="+mn-cs"/>
+              </a:defRPr>
+            </a:lvl2pPr>
+            <a:lvl3pPr marL="1143000" indent="-228600" algn="l" defTabSz="457200" rtl="0" eaLnBrk="1" latinLnBrk="0" hangingPunct="1">
+              <a:spcBef>
+                <a:spcPts val="1000"/>
+              </a:spcBef>
+              <a:spcAft>
+                <a:spcPts val="0"/>
+              </a:spcAft>
+              <a:buClr>
+                <a:schemeClr val="accent1"/>
+              </a:buClr>
+              <a:buSzPct val="80000"/>
+              <a:buFont typeface="Wingdings 3" charset="2"/>
+              <a:buChar char=""/>
+              <a:defRPr sz="1400" b="0" i="0" kern="1200">
+                <a:solidFill>
+                  <a:schemeClr val="tx1">
+                    <a:lumMod val="75000"/>
+                    <a:lumOff val="25000"/>
+                  </a:schemeClr>
+                </a:solidFill>
+                <a:latin typeface="+mn-lt"/>
+                <a:ea typeface="+mn-ea"/>
+                <a:cs typeface="+mn-cs"/>
+              </a:defRPr>
+            </a:lvl3pPr>
+            <a:lvl4pPr marL="1600200" indent="-228600" algn="l" defTabSz="457200" rtl="0" eaLnBrk="1" latinLnBrk="0" hangingPunct="1">
+              <a:spcBef>
+                <a:spcPts val="1000"/>
+              </a:spcBef>
+              <a:spcAft>
+                <a:spcPts val="0"/>
+              </a:spcAft>
+              <a:buClr>
+                <a:schemeClr val="accent1"/>
+              </a:buClr>
+              <a:buSzPct val="80000"/>
+              <a:buFont typeface="Wingdings 3" charset="2"/>
+              <a:buChar char=""/>
+              <a:defRPr sz="1200" b="0" i="0" kern="1200">
+                <a:solidFill>
+                  <a:schemeClr val="tx1">
+                    <a:lumMod val="75000"/>
+                    <a:lumOff val="25000"/>
+                  </a:schemeClr>
+                </a:solidFill>
+                <a:latin typeface="+mn-lt"/>
+                <a:ea typeface="+mn-ea"/>
+                <a:cs typeface="+mn-cs"/>
+              </a:defRPr>
+            </a:lvl4pPr>
+            <a:lvl5pPr marL="2057400" indent="-228600" algn="l" defTabSz="457200" rtl="0" eaLnBrk="1" latinLnBrk="0" hangingPunct="1">
+              <a:spcBef>
+                <a:spcPts val="1000"/>
+              </a:spcBef>
+              <a:spcAft>
+                <a:spcPts val="0"/>
+              </a:spcAft>
+              <a:buClr>
+                <a:schemeClr val="accent1"/>
+              </a:buClr>
+              <a:buSzPct val="80000"/>
+              <a:buFont typeface="Wingdings 3" charset="2"/>
+              <a:buChar char=""/>
+              <a:defRPr sz="1200" b="0" i="0" kern="1200">
+                <a:solidFill>
+                  <a:schemeClr val="tx1">
+                    <a:lumMod val="75000"/>
+                    <a:lumOff val="25000"/>
+                  </a:schemeClr>
+                </a:solidFill>
+                <a:latin typeface="+mn-lt"/>
+                <a:ea typeface="+mn-ea"/>
+                <a:cs typeface="+mn-cs"/>
+              </a:defRPr>
+            </a:lvl5pPr>
+            <a:lvl6pPr marL="2514600" indent="-228600" algn="l" defTabSz="457200" rtl="0" eaLnBrk="1" latinLnBrk="0" hangingPunct="1">
+              <a:spcBef>
+                <a:spcPts val="1000"/>
+              </a:spcBef>
+              <a:spcAft>
+                <a:spcPts val="0"/>
+              </a:spcAft>
+              <a:buClr>
+                <a:schemeClr val="accent1"/>
+              </a:buClr>
+              <a:buSzPct val="80000"/>
+              <a:buFont typeface="Wingdings 3" charset="2"/>
+              <a:buChar char=""/>
+              <a:defRPr sz="1200" b="0" i="0" kern="1200">
+                <a:solidFill>
+                  <a:schemeClr val="tx1">
+                    <a:lumMod val="75000"/>
+                    <a:lumOff val="25000"/>
+                  </a:schemeClr>
+                </a:solidFill>
+                <a:latin typeface="+mn-lt"/>
+                <a:ea typeface="+mn-ea"/>
+                <a:cs typeface="+mn-cs"/>
+              </a:defRPr>
+            </a:lvl6pPr>
+            <a:lvl7pPr marL="2971800" indent="-228600" algn="l" defTabSz="457200" rtl="0" eaLnBrk="1" latinLnBrk="0" hangingPunct="1">
+              <a:spcBef>
+                <a:spcPts val="1000"/>
+              </a:spcBef>
+              <a:spcAft>
+                <a:spcPts val="0"/>
+              </a:spcAft>
+              <a:buClr>
+                <a:schemeClr val="accent1"/>
+              </a:buClr>
+              <a:buSzPct val="80000"/>
+              <a:buFont typeface="Wingdings 3" charset="2"/>
+              <a:buChar char=""/>
+              <a:defRPr sz="1200" b="0" i="0" kern="1200">
+                <a:solidFill>
+                  <a:schemeClr val="tx1">
+                    <a:lumMod val="75000"/>
+                    <a:lumOff val="25000"/>
+                  </a:schemeClr>
+                </a:solidFill>
+                <a:latin typeface="+mn-lt"/>
+                <a:ea typeface="+mn-ea"/>
+                <a:cs typeface="+mn-cs"/>
+              </a:defRPr>
+            </a:lvl7pPr>
+            <a:lvl8pPr marL="3429000" indent="-228600" algn="l" defTabSz="457200" rtl="0" eaLnBrk="1" latinLnBrk="0" hangingPunct="1">
+              <a:spcBef>
+                <a:spcPts val="1000"/>
+              </a:spcBef>
+              <a:spcAft>
+                <a:spcPts val="0"/>
+              </a:spcAft>
+              <a:buClr>
+                <a:schemeClr val="accent1"/>
+              </a:buClr>
+              <a:buSzPct val="80000"/>
+              <a:buFont typeface="Wingdings 3" charset="2"/>
+              <a:buChar char=""/>
+              <a:defRPr sz="1200" b="0" i="0" kern="1200">
+                <a:solidFill>
+                  <a:schemeClr val="tx1">
+                    <a:lumMod val="75000"/>
+                    <a:lumOff val="25000"/>
+                  </a:schemeClr>
+                </a:solidFill>
+                <a:latin typeface="+mn-lt"/>
+                <a:ea typeface="+mn-ea"/>
+                <a:cs typeface="+mn-cs"/>
+              </a:defRPr>
+            </a:lvl8pPr>
+            <a:lvl9pPr marL="3886200" indent="-228600" algn="l" defTabSz="457200" rtl="0" eaLnBrk="1" latinLnBrk="0" hangingPunct="1">
+              <a:spcBef>
+                <a:spcPts val="1000"/>
+              </a:spcBef>
+              <a:spcAft>
+                <a:spcPts val="0"/>
+              </a:spcAft>
+              <a:buClr>
+                <a:schemeClr val="accent1"/>
+              </a:buClr>
+              <a:buSzPct val="80000"/>
+              <a:buFont typeface="Wingdings 3" charset="2"/>
+              <a:buChar char=""/>
+              <a:defRPr sz="1200" b="0" i="0" kern="1200">
+                <a:solidFill>
+                  <a:schemeClr val="tx1">
+                    <a:lumMod val="75000"/>
+                    <a:lumOff val="25000"/>
+                  </a:schemeClr>
+                </a:solidFill>
+                <a:latin typeface="+mn-lt"/>
+                <a:ea typeface="+mn-ea"/>
+                <a:cs typeface="+mn-cs"/>
+              </a:defRPr>
+            </a:lvl9pPr>
+          </a:lstStyle>
+          <a:p>
+            <a:pPr marL="0" indent="0">
+              <a:buFont typeface="Wingdings 3" charset="2"/>
+              <a:buNone/>
+            </a:pPr>
+            <a:r>
+              <a:rPr lang="en-US" b="1" dirty="0" smtClean="0"/>
+              <a:t>Front-end:</a:t>
+            </a:r>
+          </a:p>
+          <a:p>
+            <a:r>
+              <a:rPr lang="en-US" dirty="0" smtClean="0"/>
+              <a:t>User authentication and privilege designation.</a:t>
+            </a:r>
+          </a:p>
+          <a:p>
+            <a:r>
+              <a:rPr lang="en-US" dirty="0" smtClean="0"/>
+              <a:t>Features and viewable bulleting boards are designated according to user attributes (</a:t>
+            </a:r>
+            <a:r>
+              <a:rPr lang="en-US" dirty="0" err="1" smtClean="0"/>
+              <a:t>i.e</a:t>
+            </a:r>
+            <a:r>
+              <a:rPr lang="en-US" dirty="0" smtClean="0"/>
+              <a:t> lecture or student, year group, courses </a:t>
+            </a:r>
+            <a:r>
+              <a:rPr lang="en-US" dirty="0" err="1" smtClean="0"/>
+              <a:t>etc</a:t>
+            </a:r>
+            <a:r>
+              <a:rPr lang="en-US" dirty="0" smtClean="0"/>
+              <a:t>).</a:t>
+            </a:r>
+          </a:p>
+          <a:p>
+            <a:pPr marL="0" indent="0">
+              <a:buNone/>
+            </a:pPr>
+            <a:r>
+              <a:rPr lang="en-US" b="1" dirty="0" smtClean="0"/>
+              <a:t>Back-end:</a:t>
+            </a:r>
+          </a:p>
+          <a:p>
+            <a:r>
+              <a:rPr lang="en-US" dirty="0" smtClean="0"/>
+              <a:t>Relational data keeps updated information relating to users and attributes like course of study (or course being taught by lecturer) etc.</a:t>
+            </a:r>
+          </a:p>
+          <a:p>
+            <a:r>
+              <a:rPr lang="en-US" dirty="0"/>
+              <a:t>Queries are made </a:t>
+            </a:r>
+            <a:r>
+              <a:rPr lang="en-US" dirty="0" smtClean="0"/>
+              <a:t>by back-end application on behalf of front end requests.</a:t>
+            </a:r>
+            <a:endParaRPr lang="en-US" dirty="0"/>
+          </a:p>
+          <a:p>
+            <a:endParaRPr lang="en-US" dirty="0"/>
+          </a:p>
+          <a:p>
+            <a:pPr marL="0" indent="0">
+              <a:buNone/>
+            </a:pPr>
+            <a:endParaRPr lang="en-US" b="1" dirty="0" smtClean="0"/>
+          </a:p>
+          <a:p>
+            <a:pPr marL="0" indent="0">
+              <a:buNone/>
+            </a:pPr>
+            <a:endParaRPr lang="en-US" b="1" dirty="0"/>
+          </a:p>
+          <a:p>
+            <a:pPr marL="0" indent="0">
+              <a:buNone/>
+            </a:pPr>
+            <a:endParaRPr lang="en-US" dirty="0" smtClean="0"/>
+          </a:p>
+          <a:p>
+            <a:pPr marL="0" indent="0">
+              <a:buNone/>
+            </a:pPr>
+            <a:endParaRPr lang="en-US" dirty="0" smtClean="0"/>
           </a:p>
         </p:txBody>
       </p:sp>
@@ -14254,36 +14990,195 @@
           <a:lstStyle/>
           <a:p>
             <a:r>
-              <a:rPr lang="en-US" dirty="0" smtClean="0"/>
-              <a:t>Desired outcome</a:t>
-            </a:r>
-            <a:endParaRPr lang="en-US" dirty="0"/>
+              <a:rPr lang="en-US" b="1" dirty="0"/>
+              <a:t>Architecture and Functionality</a:t>
+            </a:r>
+            <a:endParaRPr lang="en-GB" dirty="0"/>
           </a:p>
         </p:txBody>
       </p:sp>
-      <p:sp>
-        <p:nvSpPr>
+      <p:pic>
+        <p:nvPicPr>
           <p:cNvPr id="4" name="Content Placeholder 3"/>
-          <p:cNvSpPr>
-            <a:spLocks noGrp="1"/>
-          </p:cNvSpPr>
+          <p:cNvPicPr>
+            <a:picLocks noGrp="1" noChangeAspect="1"/>
+          </p:cNvPicPr>
           <p:nvPr>
             <p:ph idx="1"/>
           </p:nvPr>
+        </p:nvPicPr>
+        <p:blipFill>
+          <a:blip r:embed="rId2">
+            <a:extLst>
+              <a:ext uri="{28A0092B-C50C-407E-A947-70E740481C1C}">
+                <a14:useLocalDpi xmlns:a14="http://schemas.microsoft.com/office/drawing/2010/main" val="0"/>
+              </a:ext>
+            </a:extLst>
+          </a:blip>
+          <a:stretch>
+            <a:fillRect/>
+          </a:stretch>
+        </p:blipFill>
+        <p:spPr>
+          <a:xfrm>
+            <a:off x="1089060" y="2620917"/>
+            <a:ext cx="1921668" cy="3416300"/>
+          </a:xfrm>
+        </p:spPr>
+      </p:pic>
+      <p:pic>
+        <p:nvPicPr>
+          <p:cNvPr id="8" name="Picture 7"/>
+          <p:cNvPicPr>
+            <a:picLocks noChangeAspect="1"/>
+          </p:cNvPicPr>
+          <p:nvPr/>
+        </p:nvPicPr>
+        <p:blipFill>
+          <a:blip r:embed="rId3">
+            <a:extLst>
+              <a:ext uri="{28A0092B-C50C-407E-A947-70E740481C1C}">
+                <a14:useLocalDpi xmlns:a14="http://schemas.microsoft.com/office/drawing/2010/main" val="0"/>
+              </a:ext>
+            </a:extLst>
+          </a:blip>
+          <a:stretch>
+            <a:fillRect/>
+          </a:stretch>
+        </p:blipFill>
+        <p:spPr>
+          <a:xfrm>
+            <a:off x="3019437" y="2620916"/>
+            <a:ext cx="2065973" cy="3416301"/>
+          </a:xfrm>
+          <a:prstGeom prst="rect">
+            <a:avLst/>
+          </a:prstGeom>
+        </p:spPr>
+      </p:pic>
+      <p:pic>
+        <p:nvPicPr>
+          <p:cNvPr id="9" name="Picture 8"/>
+          <p:cNvPicPr>
+            <a:picLocks noChangeAspect="1"/>
+          </p:cNvPicPr>
+          <p:nvPr/>
+        </p:nvPicPr>
+        <p:blipFill>
+          <a:blip r:embed="rId4">
+            <a:extLst>
+              <a:ext uri="{28A0092B-C50C-407E-A947-70E740481C1C}">
+                <a14:useLocalDpi xmlns:a14="http://schemas.microsoft.com/office/drawing/2010/main" val="0"/>
+              </a:ext>
+            </a:extLst>
+          </a:blip>
+          <a:stretch>
+            <a:fillRect/>
+          </a:stretch>
+        </p:blipFill>
+        <p:spPr>
+          <a:xfrm>
+            <a:off x="5111537" y="2620916"/>
+            <a:ext cx="1921669" cy="3416301"/>
+          </a:xfrm>
+          <a:prstGeom prst="rect">
+            <a:avLst/>
+          </a:prstGeom>
+        </p:spPr>
+      </p:pic>
+      <p:sp>
+        <p:nvSpPr>
+          <p:cNvPr id="10" name="Rectangle 9"/>
+          <p:cNvSpPr/>
+          <p:nvPr/>
         </p:nvSpPr>
-        <p:spPr/>
+        <p:spPr>
+          <a:xfrm>
+            <a:off x="780216" y="2251584"/>
+            <a:ext cx="1268296" cy="369332"/>
+          </a:xfrm>
+          <a:prstGeom prst="rect">
+            <a:avLst/>
+          </a:prstGeom>
+        </p:spPr>
         <p:txBody>
-          <a:bodyPr/>
+          <a:bodyPr wrap="none">
+            <a:spAutoFit/>
+          </a:bodyPr>
           <a:lstStyle/>
           <a:p>
-            <a:endParaRPr lang="en-US"/>
+            <a:r>
+              <a:rPr lang="en-GB" dirty="0" smtClean="0"/>
+              <a:t>Instructor:</a:t>
+            </a:r>
+            <a:endParaRPr lang="en-GB" dirty="0"/>
           </a:p>
         </p:txBody>
       </p:sp>
+      <p:pic>
+        <p:nvPicPr>
+          <p:cNvPr id="11" name="Picture 10"/>
+          <p:cNvPicPr>
+            <a:picLocks noChangeAspect="1"/>
+          </p:cNvPicPr>
+          <p:nvPr/>
+        </p:nvPicPr>
+        <p:blipFill>
+          <a:blip r:embed="rId5">
+            <a:extLst>
+              <a:ext uri="{28A0092B-C50C-407E-A947-70E740481C1C}">
+                <a14:useLocalDpi xmlns:a14="http://schemas.microsoft.com/office/drawing/2010/main" val="0"/>
+              </a:ext>
+            </a:extLst>
+          </a:blip>
+          <a:stretch>
+            <a:fillRect/>
+          </a:stretch>
+        </p:blipFill>
+        <p:spPr>
+          <a:xfrm>
+            <a:off x="7059333" y="2620916"/>
+            <a:ext cx="1910498" cy="3396441"/>
+          </a:xfrm>
+          <a:prstGeom prst="rect">
+            <a:avLst/>
+          </a:prstGeom>
+        </p:spPr>
+      </p:pic>
+      <p:pic>
+        <p:nvPicPr>
+          <p:cNvPr id="13" name="Picture 12"/>
+          <p:cNvPicPr>
+            <a:picLocks noChangeAspect="1"/>
+          </p:cNvPicPr>
+          <p:nvPr/>
+        </p:nvPicPr>
+        <p:blipFill>
+          <a:blip r:embed="rId6">
+            <a:extLst>
+              <a:ext uri="{28A0092B-C50C-407E-A947-70E740481C1C}">
+                <a14:useLocalDpi xmlns:a14="http://schemas.microsoft.com/office/drawing/2010/main" val="0"/>
+              </a:ext>
+            </a:extLst>
+          </a:blip>
+          <a:stretch>
+            <a:fillRect/>
+          </a:stretch>
+        </p:blipFill>
+        <p:spPr>
+          <a:xfrm>
+            <a:off x="8995959" y="2620916"/>
+            <a:ext cx="1921670" cy="3416301"/>
+          </a:xfrm>
+          <a:prstGeom prst="rect">
+            <a:avLst/>
+          </a:prstGeom>
+        </p:spPr>
+      </p:pic>
     </p:spTree>
     <p:extLst>
       <p:ext uri="{BB962C8B-B14F-4D97-AF65-F5344CB8AC3E}">
-        <p14:creationId xmlns:p14="http://schemas.microsoft.com/office/powerpoint/2010/main" val="1583502707"/>
+        <p14:creationId xmlns:p14="http://schemas.microsoft.com/office/powerpoint/2010/main" val="2641199577"/>
       </p:ext>
     </p:extLst>
   </p:cSld>

</xml_diff>

<commit_message>
readme.txt is now .md and introduces project to viewers
</commit_message>
<xml_diff>
--- a/MannschaftPresentation.pptx
+++ b/MannschaftPresentation.pptx
@@ -123,6 +123,10 @@
 </p:presentation>
 </file>
 
+<file path=ppt/revisionInfo.xml><?xml version="1.0" encoding="utf-8"?>
+<p1510:revInfo xmlns:a="http://schemas.openxmlformats.org/drawingml/2006/main" xmlns:r="http://schemas.openxmlformats.org/officeDocument/2006/relationships" xmlns:p1510="http://schemas.microsoft.com/office/powerpoint/2015/10/main"/>
+</file>
+
 <file path=ppt/slideLayouts/slideLayout1.xml><?xml version="1.0" encoding="utf-8"?>
 <p:sldLayout xmlns:a="http://schemas.openxmlformats.org/drawingml/2006/main" xmlns:r="http://schemas.openxmlformats.org/officeDocument/2006/relationships" xmlns:p="http://schemas.openxmlformats.org/presentationml/2006/main" showMasterSp="0" type="title" preserve="1">
   <p:cSld name="Title Slide">
@@ -299,7 +303,7 @@
           </a:lstStyle>
           <a:p>
             <a:r>
-              <a:rPr lang="en-US" smtClean="0"/>
+              <a:rPr lang="en-US"/>
               <a:t>Click to edit Master title style</a:t>
             </a:r>
             <a:endParaRPr lang="en-US" dirty="0"/>
@@ -419,7 +423,7 @@
           </a:lstStyle>
           <a:p>
             <a:r>
-              <a:rPr lang="en-US" smtClean="0"/>
+              <a:rPr lang="en-US"/>
               <a:t>Click to edit Master subtitle style</a:t>
             </a:r>
             <a:endParaRPr lang="en-US" dirty="0"/>
@@ -458,7 +462,7 @@
           <a:p>
             <a:fld id="{7D79E895-6B4A-41F5-BDC7-FC0F586815A2}" type="datetimeFigureOut">
               <a:rPr lang="en-US" smtClean="0"/>
-              <a:t>1/31/2018</a:t>
+              <a:t>2/1/2018</a:t>
             </a:fld>
             <a:endParaRPr lang="en-US"/>
           </a:p>
@@ -1369,7 +1373,7 @@
           </a:lstStyle>
           <a:p>
             <a:r>
-              <a:rPr lang="en-US" smtClean="0"/>
+              <a:rPr lang="en-US"/>
               <a:t>Click to edit Master title style</a:t>
             </a:r>
             <a:endParaRPr lang="en-US" dirty="0"/>
@@ -1448,7 +1452,7 @@
           </a:lstStyle>
           <a:p>
             <a:r>
-              <a:rPr lang="en-US" smtClean="0"/>
+              <a:rPr lang="en-US"/>
               <a:t>Click icon to add picture</a:t>
             </a:r>
             <a:endParaRPr lang="en-US" dirty="0"/>
@@ -1523,7 +1527,7 @@
           <a:p>
             <a:pPr lvl="0"/>
             <a:r>
-              <a:rPr lang="en-US" smtClean="0"/>
+              <a:rPr lang="en-US"/>
               <a:t>Edit Master text styles</a:t>
             </a:r>
           </a:p>
@@ -1546,7 +1550,7 @@
           <a:p>
             <a:fld id="{7D79E895-6B4A-41F5-BDC7-FC0F586815A2}" type="datetimeFigureOut">
               <a:rPr lang="en-US" smtClean="0"/>
-              <a:t>1/31/2018</a:t>
+              <a:t>2/1/2018</a:t>
             </a:fld>
             <a:endParaRPr lang="en-US"/>
           </a:p>
@@ -2435,7 +2439,7 @@
           </a:lstStyle>
           <a:p>
             <a:r>
-              <a:rPr lang="en-US" smtClean="0"/>
+              <a:rPr lang="en-US"/>
               <a:t>Click to edit Master title style</a:t>
             </a:r>
             <a:endParaRPr lang="en-US" dirty="0"/>
@@ -2503,7 +2507,7 @@
           <a:p>
             <a:pPr lvl="0"/>
             <a:r>
-              <a:rPr lang="en-US" smtClean="0"/>
+              <a:rPr lang="en-US"/>
               <a:t>Edit Master text styles</a:t>
             </a:r>
           </a:p>
@@ -2526,7 +2530,7 @@
           <a:p>
             <a:fld id="{7D79E895-6B4A-41F5-BDC7-FC0F586815A2}" type="datetimeFigureOut">
               <a:rPr lang="en-US" smtClean="0"/>
-              <a:t>1/31/2018</a:t>
+              <a:t>2/1/2018</a:t>
             </a:fld>
             <a:endParaRPr lang="en-US"/>
           </a:p>
@@ -3493,7 +3497,7 @@
           </a:lstStyle>
           <a:p>
             <a:r>
-              <a:rPr lang="en-US" smtClean="0"/>
+              <a:rPr lang="en-US"/>
               <a:t>Click to edit Master title style</a:t>
             </a:r>
             <a:endParaRPr lang="en-US" dirty="0"/>
@@ -3570,7 +3574,7 @@
           <a:p>
             <a:pPr lvl="0"/>
             <a:r>
-              <a:rPr lang="en-US" smtClean="0"/>
+              <a:rPr lang="en-US"/>
               <a:t>Edit Master text styles</a:t>
             </a:r>
           </a:p>
@@ -3637,7 +3641,7 @@
           <a:p>
             <a:pPr lvl="0"/>
             <a:r>
-              <a:rPr lang="en-US" smtClean="0"/>
+              <a:rPr lang="en-US"/>
               <a:t>Edit Master text styles</a:t>
             </a:r>
           </a:p>
@@ -3660,7 +3664,7 @@
           <a:p>
             <a:fld id="{7D79E895-6B4A-41F5-BDC7-FC0F586815A2}" type="datetimeFigureOut">
               <a:rPr lang="en-US" smtClean="0"/>
-              <a:t>1/31/2018</a:t>
+              <a:t>2/1/2018</a:t>
             </a:fld>
             <a:endParaRPr lang="en-US"/>
           </a:p>
@@ -4549,7 +4553,7 @@
           </a:lstStyle>
           <a:p>
             <a:r>
-              <a:rPr lang="en-US" smtClean="0"/>
+              <a:rPr lang="en-US"/>
               <a:t>Click to edit Master title style</a:t>
             </a:r>
             <a:endParaRPr lang="en-US" dirty="0"/>
@@ -4670,7 +4674,7 @@
           <a:p>
             <a:pPr lvl="0"/>
             <a:r>
-              <a:rPr lang="en-US" smtClean="0"/>
+              <a:rPr lang="en-US"/>
               <a:t>Edit Master text styles</a:t>
             </a:r>
           </a:p>
@@ -4693,7 +4697,7 @@
           <a:p>
             <a:fld id="{7D79E895-6B4A-41F5-BDC7-FC0F586815A2}" type="datetimeFigureOut">
               <a:rPr lang="en-US" smtClean="0"/>
-              <a:t>1/31/2018</a:t>
+              <a:t>2/1/2018</a:t>
             </a:fld>
             <a:endParaRPr lang="en-US"/>
           </a:p>
@@ -4832,7 +4836,7 @@
           </a:lstStyle>
           <a:p>
             <a:r>
-              <a:rPr lang="en-US" smtClean="0"/>
+              <a:rPr lang="en-US"/>
               <a:t>Click to edit Master title style</a:t>
             </a:r>
             <a:endParaRPr lang="en-US" dirty="0"/>
@@ -4907,7 +4911,7 @@
           <a:p>
             <a:pPr lvl="0"/>
             <a:r>
-              <a:rPr lang="en-US" smtClean="0"/>
+              <a:rPr lang="en-US"/>
               <a:t>Edit Master text styles</a:t>
             </a:r>
           </a:p>
@@ -4974,7 +4978,7 @@
           <a:p>
             <a:pPr lvl="0"/>
             <a:r>
-              <a:rPr lang="en-US" smtClean="0"/>
+              <a:rPr lang="en-US"/>
               <a:t>Edit Master text styles</a:t>
             </a:r>
           </a:p>
@@ -5048,7 +5052,7 @@
           <a:p>
             <a:pPr lvl="0"/>
             <a:r>
-              <a:rPr lang="en-US" smtClean="0"/>
+              <a:rPr lang="en-US"/>
               <a:t>Edit Master text styles</a:t>
             </a:r>
           </a:p>
@@ -5115,7 +5119,7 @@
           <a:p>
             <a:pPr lvl="0"/>
             <a:r>
-              <a:rPr lang="en-US" smtClean="0"/>
+              <a:rPr lang="en-US"/>
               <a:t>Edit Master text styles</a:t>
             </a:r>
           </a:p>
@@ -5189,7 +5193,7 @@
           <a:p>
             <a:pPr lvl="0"/>
             <a:r>
-              <a:rPr lang="en-US" smtClean="0"/>
+              <a:rPr lang="en-US"/>
               <a:t>Edit Master text styles</a:t>
             </a:r>
           </a:p>
@@ -5256,7 +5260,7 @@
           <a:p>
             <a:pPr lvl="0"/>
             <a:r>
-              <a:rPr lang="en-US" smtClean="0"/>
+              <a:rPr lang="en-US"/>
               <a:t>Edit Master text styles</a:t>
             </a:r>
           </a:p>
@@ -5353,7 +5357,7 @@
           <a:p>
             <a:fld id="{7D79E895-6B4A-41F5-BDC7-FC0F586815A2}" type="datetimeFigureOut">
               <a:rPr lang="en-US" smtClean="0"/>
-              <a:t>1/31/2018</a:t>
+              <a:t>2/1/2018</a:t>
             </a:fld>
             <a:endParaRPr lang="en-US"/>
           </a:p>
@@ -5456,7 +5460,7 @@
           </a:lstStyle>
           <a:p>
             <a:r>
-              <a:rPr lang="en-US" smtClean="0"/>
+              <a:rPr lang="en-US"/>
               <a:t>Click to edit Master title style</a:t>
             </a:r>
             <a:endParaRPr lang="en-US" dirty="0"/>
@@ -5531,7 +5535,7 @@
           <a:p>
             <a:pPr lvl="0"/>
             <a:r>
-              <a:rPr lang="en-US" smtClean="0"/>
+              <a:rPr lang="en-US"/>
               <a:t>Edit Master text styles</a:t>
             </a:r>
           </a:p>
@@ -5609,7 +5613,7 @@
           </a:lstStyle>
           <a:p>
             <a:r>
-              <a:rPr lang="en-US" smtClean="0"/>
+              <a:rPr lang="en-US"/>
               <a:t>Click icon to add picture</a:t>
             </a:r>
             <a:endParaRPr lang="en-US" dirty="0"/>
@@ -5677,7 +5681,7 @@
           <a:p>
             <a:pPr lvl="0"/>
             <a:r>
-              <a:rPr lang="en-US" smtClean="0"/>
+              <a:rPr lang="en-US"/>
               <a:t>Edit Master text styles</a:t>
             </a:r>
           </a:p>
@@ -5751,7 +5755,7 @@
           <a:p>
             <a:pPr lvl="0"/>
             <a:r>
-              <a:rPr lang="en-US" smtClean="0"/>
+              <a:rPr lang="en-US"/>
               <a:t>Edit Master text styles</a:t>
             </a:r>
           </a:p>
@@ -5829,7 +5833,7 @@
           </a:lstStyle>
           <a:p>
             <a:r>
-              <a:rPr lang="en-US" smtClean="0"/>
+              <a:rPr lang="en-US"/>
               <a:t>Click icon to add picture</a:t>
             </a:r>
             <a:endParaRPr lang="en-US" dirty="0"/>
@@ -5897,7 +5901,7 @@
           <a:p>
             <a:pPr lvl="0"/>
             <a:r>
-              <a:rPr lang="en-US" smtClean="0"/>
+              <a:rPr lang="en-US"/>
               <a:t>Edit Master text styles</a:t>
             </a:r>
           </a:p>
@@ -5971,7 +5975,7 @@
           <a:p>
             <a:pPr lvl="0"/>
             <a:r>
-              <a:rPr lang="en-US" smtClean="0"/>
+              <a:rPr lang="en-US"/>
               <a:t>Edit Master text styles</a:t>
             </a:r>
           </a:p>
@@ -6049,7 +6053,7 @@
           </a:lstStyle>
           <a:p>
             <a:r>
-              <a:rPr lang="en-US" smtClean="0"/>
+              <a:rPr lang="en-US"/>
               <a:t>Click icon to add picture</a:t>
             </a:r>
             <a:endParaRPr lang="en-US" dirty="0"/>
@@ -6117,7 +6121,7 @@
           <a:p>
             <a:pPr lvl="0"/>
             <a:r>
-              <a:rPr lang="en-US" smtClean="0"/>
+              <a:rPr lang="en-US"/>
               <a:t>Edit Master text styles</a:t>
             </a:r>
           </a:p>
@@ -6214,7 +6218,7 @@
           <a:p>
             <a:fld id="{7D79E895-6B4A-41F5-BDC7-FC0F586815A2}" type="datetimeFigureOut">
               <a:rPr lang="en-US" smtClean="0"/>
-              <a:t>1/31/2018</a:t>
+              <a:t>2/1/2018</a:t>
             </a:fld>
             <a:endParaRPr lang="en-US"/>
           </a:p>
@@ -6318,7 +6322,7 @@
           <a:lstStyle/>
           <a:p>
             <a:r>
-              <a:rPr lang="en-US" smtClean="0"/>
+              <a:rPr lang="en-US"/>
               <a:t>Click to edit Master title style</a:t>
             </a:r>
             <a:endParaRPr lang="en-US" dirty="0"/>
@@ -6347,35 +6351,35 @@
           <a:p>
             <a:pPr lvl="0"/>
             <a:r>
-              <a:rPr lang="en-US" smtClean="0"/>
+              <a:rPr lang="en-US"/>
               <a:t>Edit Master text styles</a:t>
             </a:r>
           </a:p>
           <a:p>
             <a:pPr lvl="1"/>
             <a:r>
-              <a:rPr lang="en-US" smtClean="0"/>
+              <a:rPr lang="en-US"/>
               <a:t>Second level</a:t>
             </a:r>
           </a:p>
           <a:p>
             <a:pPr lvl="2"/>
             <a:r>
-              <a:rPr lang="en-US" smtClean="0"/>
+              <a:rPr lang="en-US"/>
               <a:t>Third level</a:t>
             </a:r>
           </a:p>
           <a:p>
             <a:pPr lvl="3"/>
             <a:r>
-              <a:rPr lang="en-US" smtClean="0"/>
+              <a:rPr lang="en-US"/>
               <a:t>Fourth level</a:t>
             </a:r>
           </a:p>
           <a:p>
             <a:pPr lvl="4"/>
             <a:r>
-              <a:rPr lang="en-US" smtClean="0"/>
+              <a:rPr lang="en-US"/>
               <a:t>Fifth level</a:t>
             </a:r>
             <a:endParaRPr lang="en-US" dirty="0"/>
@@ -6404,7 +6408,7 @@
           <a:p>
             <a:fld id="{7D79E895-6B4A-41F5-BDC7-FC0F586815A2}" type="datetimeFigureOut">
               <a:rPr lang="en-US" smtClean="0"/>
-              <a:t>1/31/2018</a:t>
+              <a:t>2/1/2018</a:t>
             </a:fld>
             <a:endParaRPr lang="en-US"/>
           </a:p>
@@ -7290,7 +7294,7 @@
           <a:lstStyle/>
           <a:p>
             <a:r>
-              <a:rPr lang="en-US" smtClean="0"/>
+              <a:rPr lang="en-US"/>
               <a:t>Click to edit Master title style</a:t>
             </a:r>
             <a:endParaRPr lang="en-US" dirty="0"/>
@@ -7319,35 +7323,35 @@
           <a:p>
             <a:pPr lvl="0"/>
             <a:r>
-              <a:rPr lang="en-US" smtClean="0"/>
+              <a:rPr lang="en-US"/>
               <a:t>Edit Master text styles</a:t>
             </a:r>
           </a:p>
           <a:p>
             <a:pPr lvl="1"/>
             <a:r>
-              <a:rPr lang="en-US" smtClean="0"/>
+              <a:rPr lang="en-US"/>
               <a:t>Second level</a:t>
             </a:r>
           </a:p>
           <a:p>
             <a:pPr lvl="2"/>
             <a:r>
-              <a:rPr lang="en-US" smtClean="0"/>
+              <a:rPr lang="en-US"/>
               <a:t>Third level</a:t>
             </a:r>
           </a:p>
           <a:p>
             <a:pPr lvl="3"/>
             <a:r>
-              <a:rPr lang="en-US" smtClean="0"/>
+              <a:rPr lang="en-US"/>
               <a:t>Fourth level</a:t>
             </a:r>
           </a:p>
           <a:p>
             <a:pPr lvl="4"/>
             <a:r>
-              <a:rPr lang="en-US" smtClean="0"/>
+              <a:rPr lang="en-US"/>
               <a:t>Fifth level</a:t>
             </a:r>
             <a:endParaRPr lang="en-US" dirty="0"/>
@@ -7376,7 +7380,7 @@
           <a:p>
             <a:fld id="{7D79E895-6B4A-41F5-BDC7-FC0F586815A2}" type="datetimeFigureOut">
               <a:rPr lang="en-US" smtClean="0"/>
-              <a:t>1/31/2018</a:t>
+              <a:t>2/1/2018</a:t>
             </a:fld>
             <a:endParaRPr lang="en-US"/>
           </a:p>
@@ -7506,7 +7510,7 @@
           <a:lstStyle/>
           <a:p>
             <a:r>
-              <a:rPr lang="en-US" smtClean="0"/>
+              <a:rPr lang="en-US"/>
               <a:t>Click to edit Master title style</a:t>
             </a:r>
             <a:endParaRPr lang="en-US" dirty="0"/>
@@ -7535,35 +7539,35 @@
           <a:p>
             <a:pPr lvl="0"/>
             <a:r>
-              <a:rPr lang="en-US" smtClean="0"/>
+              <a:rPr lang="en-US"/>
               <a:t>Edit Master text styles</a:t>
             </a:r>
           </a:p>
           <a:p>
             <a:pPr lvl="1"/>
             <a:r>
-              <a:rPr lang="en-US" smtClean="0"/>
+              <a:rPr lang="en-US"/>
               <a:t>Second level</a:t>
             </a:r>
           </a:p>
           <a:p>
             <a:pPr lvl="2"/>
             <a:r>
-              <a:rPr lang="en-US" smtClean="0"/>
+              <a:rPr lang="en-US"/>
               <a:t>Third level</a:t>
             </a:r>
           </a:p>
           <a:p>
             <a:pPr lvl="3"/>
             <a:r>
-              <a:rPr lang="en-US" smtClean="0"/>
+              <a:rPr lang="en-US"/>
               <a:t>Fourth level</a:t>
             </a:r>
           </a:p>
           <a:p>
             <a:pPr lvl="4"/>
             <a:r>
-              <a:rPr lang="en-US" smtClean="0"/>
+              <a:rPr lang="en-US"/>
               <a:t>Fifth level</a:t>
             </a:r>
             <a:endParaRPr lang="en-US" dirty="0"/>
@@ -7587,7 +7591,7 @@
           <a:p>
             <a:fld id="{7D79E895-6B4A-41F5-BDC7-FC0F586815A2}" type="datetimeFigureOut">
               <a:rPr lang="en-US" smtClean="0"/>
-              <a:t>1/31/2018</a:t>
+              <a:t>2/1/2018</a:t>
             </a:fld>
             <a:endParaRPr lang="en-US"/>
           </a:p>
@@ -8477,7 +8481,7 @@
           </a:lstStyle>
           <a:p>
             <a:r>
-              <a:rPr lang="en-US" smtClean="0"/>
+              <a:rPr lang="en-US"/>
               <a:t>Click to edit Master title style</a:t>
             </a:r>
             <a:endParaRPr lang="en-US" dirty="0"/>
@@ -8598,7 +8602,7 @@
           <a:p>
             <a:pPr lvl="0"/>
             <a:r>
-              <a:rPr lang="en-US" smtClean="0"/>
+              <a:rPr lang="en-US"/>
               <a:t>Edit Master text styles</a:t>
             </a:r>
           </a:p>
@@ -8621,7 +8625,7 @@
           <a:p>
             <a:fld id="{7D79E895-6B4A-41F5-BDC7-FC0F586815A2}" type="datetimeFigureOut">
               <a:rPr lang="en-US" smtClean="0"/>
-              <a:t>1/31/2018</a:t>
+              <a:t>2/1/2018</a:t>
             </a:fld>
             <a:endParaRPr lang="en-US"/>
           </a:p>
@@ -8751,7 +8755,7 @@
           <a:lstStyle/>
           <a:p>
             <a:r>
-              <a:rPr lang="en-US" smtClean="0"/>
+              <a:rPr lang="en-US"/>
               <a:t>Click to edit Master title style</a:t>
             </a:r>
             <a:endParaRPr lang="en-US" dirty="0"/>
@@ -8782,35 +8786,35 @@
           <a:p>
             <a:pPr lvl="0"/>
             <a:r>
-              <a:rPr lang="en-US" smtClean="0"/>
+              <a:rPr lang="en-US"/>
               <a:t>Edit Master text styles</a:t>
             </a:r>
           </a:p>
           <a:p>
             <a:pPr lvl="1"/>
             <a:r>
-              <a:rPr lang="en-US" smtClean="0"/>
+              <a:rPr lang="en-US"/>
               <a:t>Second level</a:t>
             </a:r>
           </a:p>
           <a:p>
             <a:pPr lvl="2"/>
             <a:r>
-              <a:rPr lang="en-US" smtClean="0"/>
+              <a:rPr lang="en-US"/>
               <a:t>Third level</a:t>
             </a:r>
           </a:p>
           <a:p>
             <a:pPr lvl="3"/>
             <a:r>
-              <a:rPr lang="en-US" smtClean="0"/>
+              <a:rPr lang="en-US"/>
               <a:t>Fourth level</a:t>
             </a:r>
           </a:p>
           <a:p>
             <a:pPr lvl="4"/>
             <a:r>
-              <a:rPr lang="en-US" smtClean="0"/>
+              <a:rPr lang="en-US"/>
               <a:t>Fifth level</a:t>
             </a:r>
             <a:endParaRPr lang="en-US" dirty="0"/>
@@ -8841,35 +8845,35 @@
           <a:p>
             <a:pPr lvl="0"/>
             <a:r>
-              <a:rPr lang="en-US" smtClean="0"/>
+              <a:rPr lang="en-US"/>
               <a:t>Edit Master text styles</a:t>
             </a:r>
           </a:p>
           <a:p>
             <a:pPr lvl="1"/>
             <a:r>
-              <a:rPr lang="en-US" smtClean="0"/>
+              <a:rPr lang="en-US"/>
               <a:t>Second level</a:t>
             </a:r>
           </a:p>
           <a:p>
             <a:pPr lvl="2"/>
             <a:r>
-              <a:rPr lang="en-US" smtClean="0"/>
+              <a:rPr lang="en-US"/>
               <a:t>Third level</a:t>
             </a:r>
           </a:p>
           <a:p>
             <a:pPr lvl="3"/>
             <a:r>
-              <a:rPr lang="en-US" smtClean="0"/>
+              <a:rPr lang="en-US"/>
               <a:t>Fourth level</a:t>
             </a:r>
           </a:p>
           <a:p>
             <a:pPr lvl="4"/>
             <a:r>
-              <a:rPr lang="en-US" smtClean="0"/>
+              <a:rPr lang="en-US"/>
               <a:t>Fifth level</a:t>
             </a:r>
             <a:endParaRPr lang="en-US" dirty="0"/>
@@ -8893,7 +8897,7 @@
           <a:p>
             <a:fld id="{7D79E895-6B4A-41F5-BDC7-FC0F586815A2}" type="datetimeFigureOut">
               <a:rPr lang="en-US" smtClean="0"/>
-              <a:t>1/31/2018</a:t>
+              <a:t>2/1/2018</a:t>
             </a:fld>
             <a:endParaRPr lang="en-US"/>
           </a:p>
@@ -8991,7 +8995,7 @@
           </a:lstStyle>
           <a:p>
             <a:r>
-              <a:rPr lang="en-US" smtClean="0"/>
+              <a:rPr lang="en-US"/>
               <a:t>Click to edit Master title style</a:t>
             </a:r>
             <a:endParaRPr lang="en-US" dirty="0"/>
@@ -9063,7 +9067,7 @@
           <a:p>
             <a:pPr lvl="0"/>
             <a:r>
-              <a:rPr lang="en-US" smtClean="0"/>
+              <a:rPr lang="en-US"/>
               <a:t>Edit Master text styles</a:t>
             </a:r>
           </a:p>
@@ -9093,35 +9097,35 @@
           <a:p>
             <a:pPr lvl="0"/>
             <a:r>
-              <a:rPr lang="en-US" smtClean="0"/>
+              <a:rPr lang="en-US"/>
               <a:t>Edit Master text styles</a:t>
             </a:r>
           </a:p>
           <a:p>
             <a:pPr lvl="1"/>
             <a:r>
-              <a:rPr lang="en-US" smtClean="0"/>
+              <a:rPr lang="en-US"/>
               <a:t>Second level</a:t>
             </a:r>
           </a:p>
           <a:p>
             <a:pPr lvl="2"/>
             <a:r>
-              <a:rPr lang="en-US" smtClean="0"/>
+              <a:rPr lang="en-US"/>
               <a:t>Third level</a:t>
             </a:r>
           </a:p>
           <a:p>
             <a:pPr lvl="3"/>
             <a:r>
-              <a:rPr lang="en-US" smtClean="0"/>
+              <a:rPr lang="en-US"/>
               <a:t>Fourth level</a:t>
             </a:r>
           </a:p>
           <a:p>
             <a:pPr lvl="4"/>
             <a:r>
-              <a:rPr lang="en-US" smtClean="0"/>
+              <a:rPr lang="en-US"/>
               <a:t>Fifth level</a:t>
             </a:r>
             <a:endParaRPr lang="en-US" dirty="0"/>
@@ -9193,7 +9197,7 @@
           <a:p>
             <a:pPr lvl="0"/>
             <a:r>
-              <a:rPr lang="en-US" smtClean="0"/>
+              <a:rPr lang="en-US"/>
               <a:t>Edit Master text styles</a:t>
             </a:r>
           </a:p>
@@ -9251,35 +9255,35 @@
           <a:p>
             <a:pPr lvl="0"/>
             <a:r>
-              <a:rPr lang="en-US" smtClean="0"/>
+              <a:rPr lang="en-US"/>
               <a:t>Edit Master text styles</a:t>
             </a:r>
           </a:p>
           <a:p>
             <a:pPr lvl="1"/>
             <a:r>
-              <a:rPr lang="en-US" smtClean="0"/>
+              <a:rPr lang="en-US"/>
               <a:t>Second level</a:t>
             </a:r>
           </a:p>
           <a:p>
             <a:pPr lvl="2"/>
             <a:r>
-              <a:rPr lang="en-US" smtClean="0"/>
+              <a:rPr lang="en-US"/>
               <a:t>Third level</a:t>
             </a:r>
           </a:p>
           <a:p>
             <a:pPr lvl="3"/>
             <a:r>
-              <a:rPr lang="en-US" smtClean="0"/>
+              <a:rPr lang="en-US"/>
               <a:t>Fourth level</a:t>
             </a:r>
           </a:p>
           <a:p>
             <a:pPr lvl="4"/>
             <a:r>
-              <a:rPr lang="en-US" smtClean="0"/>
+              <a:rPr lang="en-US"/>
               <a:t>Fifth level</a:t>
             </a:r>
             <a:endParaRPr lang="en-US" dirty="0"/>
@@ -9303,7 +9307,7 @@
           <a:p>
             <a:fld id="{7D79E895-6B4A-41F5-BDC7-FC0F586815A2}" type="datetimeFigureOut">
               <a:rPr lang="en-US" smtClean="0"/>
-              <a:t>1/31/2018</a:t>
+              <a:t>2/1/2018</a:t>
             </a:fld>
             <a:endParaRPr lang="en-US"/>
           </a:p>
@@ -9406,7 +9410,7 @@
           </a:lstStyle>
           <a:p>
             <a:r>
-              <a:rPr lang="en-US" smtClean="0"/>
+              <a:rPr lang="en-US"/>
               <a:t>Click to edit Master title style</a:t>
             </a:r>
             <a:endParaRPr lang="en-US" dirty="0"/>
@@ -9430,7 +9434,7 @@
           <a:p>
             <a:fld id="{7D79E895-6B4A-41F5-BDC7-FC0F586815A2}" type="datetimeFigureOut">
               <a:rPr lang="en-US" smtClean="0"/>
-              <a:t>1/31/2018</a:t>
+              <a:t>2/1/2018</a:t>
             </a:fld>
             <a:endParaRPr lang="en-US"/>
           </a:p>
@@ -9525,7 +9529,7 @@
           <a:p>
             <a:fld id="{7D79E895-6B4A-41F5-BDC7-FC0F586815A2}" type="datetimeFigureOut">
               <a:rPr lang="en-US" smtClean="0"/>
-              <a:t>1/31/2018</a:t>
+              <a:t>2/1/2018</a:t>
             </a:fld>
             <a:endParaRPr lang="en-US"/>
           </a:p>
@@ -10451,7 +10455,7 @@
           </a:lstStyle>
           <a:p>
             <a:r>
-              <a:rPr lang="en-US" smtClean="0"/>
+              <a:rPr lang="en-US"/>
               <a:t>Click to edit Master title style</a:t>
             </a:r>
             <a:endParaRPr lang="en-US" dirty="0"/>
@@ -10482,35 +10486,35 @@
           <a:p>
             <a:pPr lvl="0"/>
             <a:r>
-              <a:rPr lang="en-US" smtClean="0"/>
+              <a:rPr lang="en-US"/>
               <a:t>Edit Master text styles</a:t>
             </a:r>
           </a:p>
           <a:p>
             <a:pPr lvl="1"/>
             <a:r>
-              <a:rPr lang="en-US" smtClean="0"/>
+              <a:rPr lang="en-US"/>
               <a:t>Second level</a:t>
             </a:r>
           </a:p>
           <a:p>
             <a:pPr lvl="2"/>
             <a:r>
-              <a:rPr lang="en-US" smtClean="0"/>
+              <a:rPr lang="en-US"/>
               <a:t>Third level</a:t>
             </a:r>
           </a:p>
           <a:p>
             <a:pPr lvl="3"/>
             <a:r>
-              <a:rPr lang="en-US" smtClean="0"/>
+              <a:rPr lang="en-US"/>
               <a:t>Fourth level</a:t>
             </a:r>
           </a:p>
           <a:p>
             <a:pPr lvl="4"/>
             <a:r>
-              <a:rPr lang="en-US" smtClean="0"/>
+              <a:rPr lang="en-US"/>
               <a:t>Fifth level</a:t>
             </a:r>
             <a:endParaRPr lang="en-US" dirty="0"/>
@@ -10583,7 +10587,7 @@
           <a:p>
             <a:pPr lvl="0"/>
             <a:r>
-              <a:rPr lang="en-US" smtClean="0"/>
+              <a:rPr lang="en-US"/>
               <a:t>Edit Master text styles</a:t>
             </a:r>
           </a:p>
@@ -10606,7 +10610,7 @@
           <a:p>
             <a:fld id="{7D79E895-6B4A-41F5-BDC7-FC0F586815A2}" type="datetimeFigureOut">
               <a:rPr lang="en-US" smtClean="0"/>
-              <a:t>1/31/2018</a:t>
+              <a:t>2/1/2018</a:t>
             </a:fld>
             <a:endParaRPr lang="en-US"/>
           </a:p>
@@ -11534,7 +11538,7 @@
           </a:lstStyle>
           <a:p>
             <a:r>
-              <a:rPr lang="en-US" smtClean="0"/>
+              <a:rPr lang="en-US"/>
               <a:t>Click to edit Master title style</a:t>
             </a:r>
             <a:endParaRPr lang="en-US" dirty="0"/>
@@ -11616,7 +11620,7 @@
               <a:buNone/>
             </a:pPr>
             <a:r>
-              <a:rPr lang="en-US" smtClean="0"/>
+              <a:rPr lang="en-US"/>
               <a:t>Click icon to add picture</a:t>
             </a:r>
             <a:endParaRPr lang="en-US" dirty="0"/>
@@ -11691,7 +11695,7 @@
           <a:p>
             <a:pPr lvl="0"/>
             <a:r>
-              <a:rPr lang="en-US" smtClean="0"/>
+              <a:rPr lang="en-US"/>
               <a:t>Edit Master text styles</a:t>
             </a:r>
           </a:p>
@@ -11714,7 +11718,7 @@
           <a:p>
             <a:fld id="{7D79E895-6B4A-41F5-BDC7-FC0F586815A2}" type="datetimeFigureOut">
               <a:rPr lang="en-US" smtClean="0"/>
-              <a:t>1/31/2018</a:t>
+              <a:t>2/1/2018</a:t>
             </a:fld>
             <a:endParaRPr lang="en-US"/>
           </a:p>
@@ -12609,7 +12613,7 @@
           <a:lstStyle/>
           <a:p>
             <a:r>
-              <a:rPr lang="en-US" smtClean="0"/>
+              <a:rPr lang="en-US"/>
               <a:t>Click to edit Master title style</a:t>
             </a:r>
             <a:endParaRPr lang="en-US" dirty="0"/>
@@ -12643,35 +12647,35 @@
           <a:p>
             <a:pPr lvl="0"/>
             <a:r>
-              <a:rPr lang="en-US" smtClean="0"/>
+              <a:rPr lang="en-US"/>
               <a:t>Edit Master text styles</a:t>
             </a:r>
           </a:p>
           <a:p>
             <a:pPr lvl="1"/>
             <a:r>
-              <a:rPr lang="en-US" smtClean="0"/>
+              <a:rPr lang="en-US"/>
               <a:t>Second level</a:t>
             </a:r>
           </a:p>
           <a:p>
             <a:pPr lvl="2"/>
             <a:r>
-              <a:rPr lang="en-US" smtClean="0"/>
+              <a:rPr lang="en-US"/>
               <a:t>Third level</a:t>
             </a:r>
           </a:p>
           <a:p>
             <a:pPr lvl="3"/>
             <a:r>
-              <a:rPr lang="en-US" smtClean="0"/>
+              <a:rPr lang="en-US"/>
               <a:t>Fourth level</a:t>
             </a:r>
           </a:p>
           <a:p>
             <a:pPr lvl="4"/>
             <a:r>
-              <a:rPr lang="en-US" smtClean="0"/>
+              <a:rPr lang="en-US"/>
               <a:t>Fifth level</a:t>
             </a:r>
             <a:endParaRPr lang="en-US" dirty="0"/>
@@ -12711,7 +12715,7 @@
           <a:p>
             <a:fld id="{7D79E895-6B4A-41F5-BDC7-FC0F586815A2}" type="datetimeFigureOut">
               <a:rPr lang="en-US" smtClean="0"/>
-              <a:t>1/31/2018</a:t>
+              <a:t>2/1/2018</a:t>
             </a:fld>
             <a:endParaRPr lang="en-US"/>
           </a:p>
@@ -13289,24 +13293,23 @@
           <a:p>
             <a:pPr algn="ctr"/>
             <a:r>
-              <a:rPr lang="en-US" sz="2800" b="1" dirty="0" smtClean="0"/>
+              <a:rPr lang="en-US" sz="2800" b="1" dirty="0"/>
               <a:t>KWAME NKRUMAH UNIVERSITY OF SCIENCE AND TECHNOLOGY</a:t>
             </a:r>
             <a:br>
-              <a:rPr lang="en-US" sz="2800" b="1" dirty="0" smtClean="0"/>
+              <a:rPr lang="en-US" sz="2800" b="1" dirty="0"/>
             </a:br>
             <a:r>
-              <a:rPr lang="en-US" sz="2400" b="1" dirty="0" smtClean="0"/>
+              <a:rPr lang="en-US" sz="2400" b="1" dirty="0"/>
               <a:t>COLLEGE OF ENGINEERING</a:t>
             </a:r>
             <a:br>
-              <a:rPr lang="en-US" sz="2400" b="1" dirty="0" smtClean="0"/>
+              <a:rPr lang="en-US" sz="2400" b="1" dirty="0"/>
             </a:br>
             <a:r>
-              <a:rPr lang="en-US" sz="2400" b="1" dirty="0" smtClean="0"/>
+              <a:rPr lang="en-US" sz="2400" b="1" dirty="0"/>
               <a:t>DEPARTMENT OF COMPUTER ENGINEERING</a:t>
             </a:r>
-            <a:endParaRPr lang="en-US" sz="2400" b="1" dirty="0"/>
           </a:p>
         </p:txBody>
       </p:sp>
@@ -13418,10 +13421,9 @@
           <a:lstStyle/>
           <a:p>
             <a:r>
-              <a:rPr lang="en-GB" dirty="0" smtClean="0"/>
+              <a:rPr lang="en-GB" dirty="0"/>
               <a:t>Instructor:</a:t>
             </a:r>
-            <a:endParaRPr lang="en-GB" dirty="0"/>
           </a:p>
         </p:txBody>
       </p:sp>
@@ -13448,7 +13450,7 @@
         <p:spPr>
           <a:xfrm>
             <a:off x="841176" y="2620916"/>
-            <a:ext cx="1971693" cy="3416301"/>
+            <a:ext cx="2460331" cy="4262951"/>
           </a:xfrm>
           <a:prstGeom prst="rect">
             <a:avLst/>
@@ -13477,8 +13479,8 @@
         </p:blipFill>
         <p:spPr>
           <a:xfrm>
-            <a:off x="2873830" y="2620916"/>
-            <a:ext cx="1910498" cy="3396441"/>
+            <a:off x="3422470" y="2620916"/>
+            <a:ext cx="2383970" cy="4238169"/>
           </a:xfrm>
           <a:prstGeom prst="rect">
             <a:avLst/>
@@ -13560,10 +13562,9 @@
           <a:lstStyle/>
           <a:p>
             <a:r>
-              <a:rPr lang="en-GB" dirty="0" smtClean="0"/>
+              <a:rPr lang="en-GB" dirty="0"/>
               <a:t>Students:</a:t>
             </a:r>
-            <a:endParaRPr lang="en-GB" dirty="0"/>
           </a:p>
         </p:txBody>
       </p:sp>
@@ -13589,8 +13590,8 @@
         </p:blipFill>
         <p:spPr>
           <a:xfrm>
-            <a:off x="1066670" y="2620915"/>
-            <a:ext cx="1856648" cy="3396441"/>
+            <a:off x="392300" y="2620915"/>
+            <a:ext cx="2234234" cy="4087174"/>
           </a:xfrm>
           <a:prstGeom prst="rect">
             <a:avLst/>
@@ -13619,8 +13620,8 @@
         </p:blipFill>
         <p:spPr>
           <a:xfrm>
-            <a:off x="2985206" y="2620915"/>
-            <a:ext cx="1910498" cy="3396441"/>
+            <a:off x="2642305" y="2620915"/>
+            <a:ext cx="2299035" cy="4087173"/>
           </a:xfrm>
           <a:prstGeom prst="rect">
             <a:avLst/>
@@ -13649,8 +13650,8 @@
         </p:blipFill>
         <p:spPr>
           <a:xfrm>
-            <a:off x="4957592" y="2620915"/>
-            <a:ext cx="1910498" cy="3396441"/>
+            <a:off x="4957591" y="2620915"/>
+            <a:ext cx="2299035" cy="4087173"/>
           </a:xfrm>
           <a:prstGeom prst="rect">
             <a:avLst/>
@@ -13679,8 +13680,8 @@
         </p:blipFill>
         <p:spPr>
           <a:xfrm>
-            <a:off x="6929978" y="2620915"/>
-            <a:ext cx="1910498" cy="3396441"/>
+            <a:off x="7284307" y="2620915"/>
+            <a:ext cx="2299035" cy="4087173"/>
           </a:xfrm>
           <a:prstGeom prst="rect">
             <a:avLst/>
@@ -13709,8 +13710,8 @@
         </p:blipFill>
         <p:spPr>
           <a:xfrm>
-            <a:off x="8902365" y="2620915"/>
-            <a:ext cx="1910498" cy="3396441"/>
+            <a:off x="9633884" y="2620915"/>
+            <a:ext cx="2299035" cy="4087173"/>
           </a:xfrm>
           <a:prstGeom prst="rect">
             <a:avLst/>
@@ -13763,10 +13764,9 @@
           <a:lstStyle/>
           <a:p>
             <a:r>
-              <a:rPr lang="en-US" dirty="0" smtClean="0"/>
+              <a:rPr lang="en-US" dirty="0"/>
               <a:t>Desired outcome</a:t>
             </a:r>
-            <a:endParaRPr lang="en-US" dirty="0"/>
           </a:p>
         </p:txBody>
       </p:sp>
@@ -13789,34 +13789,33 @@
               <a:buNone/>
             </a:pPr>
             <a:r>
-              <a:rPr lang="en-US" b="1" dirty="0" smtClean="0"/>
+              <a:rPr lang="en-US" b="1" dirty="0"/>
               <a:t>We expect that:</a:t>
             </a:r>
           </a:p>
           <a:p>
             <a:r>
-              <a:rPr lang="en-US" dirty="0" smtClean="0"/>
+              <a:rPr lang="en-US" dirty="0"/>
               <a:t>Communication between instructors and students is clear and noise free.</a:t>
             </a:r>
           </a:p>
           <a:p>
             <a:r>
-              <a:rPr lang="en-US" dirty="0" smtClean="0"/>
-              <a:t>Student thoughts on changes are taking into consideration.</a:t>
-            </a:r>
-          </a:p>
-          <a:p>
-            <a:r>
-              <a:rPr lang="en-US" dirty="0" smtClean="0"/>
+              <a:rPr lang="en-US" dirty="0"/>
+              <a:t>Student opinions on changes are taking into consideration.</a:t>
+            </a:r>
+          </a:p>
+          <a:p>
+            <a:r>
+              <a:rPr lang="en-US" dirty="0"/>
               <a:t>Class reschedules are carried out swiftly.</a:t>
             </a:r>
           </a:p>
           <a:p>
             <a:r>
-              <a:rPr lang="en-US" dirty="0" smtClean="0"/>
+              <a:rPr lang="en-US" dirty="0"/>
               <a:t>Venue conflicts are resolved faster.</a:t>
             </a:r>
-            <a:endParaRPr lang="en-US" dirty="0"/>
           </a:p>
         </p:txBody>
       </p:sp>
@@ -13870,28 +13869,19 @@
             <a:pPr algn="ctr"/>
             <a:r>
               <a:rPr lang="en-US" sz="2800" b="1" dirty="0"/>
-              <a:t> </a:t>
-            </a:r>
-            <a:r>
-              <a:rPr lang="en-US" sz="2800" b="1" dirty="0" smtClean="0"/>
-              <a:t>                  </a:t>
-            </a:r>
-            <a:r>
-              <a:rPr lang="en-US" sz="4000" b="1" dirty="0" smtClean="0"/>
+              <a:t>                   </a:t>
+            </a:r>
+            <a:r>
+              <a:rPr lang="en-US" sz="4000" b="1" dirty="0"/>
               <a:t>PRESENTATION ON ELECTRONIC CLASSREP</a:t>
             </a:r>
-            <a:r>
-              <a:rPr lang="en-US" sz="2800" b="1" dirty="0" smtClean="0"/>
-              <a:t/>
-            </a:r>
             <a:br>
-              <a:rPr lang="en-US" sz="2800" b="1" dirty="0" smtClean="0"/>
+              <a:rPr lang="en-US" sz="2800" b="1" dirty="0"/>
             </a:br>
             <a:r>
-              <a:rPr lang="en-US" sz="2800" b="1" dirty="0" smtClean="0"/>
+              <a:rPr lang="en-US" sz="2800" b="1" dirty="0"/>
               <a:t>       SOFTWARE ENGINEERING  </a:t>
             </a:r>
-            <a:endParaRPr lang="en-US" sz="2800" b="1" dirty="0"/>
           </a:p>
         </p:txBody>
       </p:sp>
@@ -13914,11 +13904,11 @@
               <a:buNone/>
             </a:pPr>
             <a:r>
-              <a:rPr lang="en-US" dirty="0" smtClean="0"/>
+              <a:rPr lang="en-US" dirty="0"/>
               <a:t>                                              </a:t>
             </a:r>
             <a:r>
-              <a:rPr lang="en-US" sz="4000" dirty="0" smtClean="0"/>
+              <a:rPr lang="en-US" sz="4000" dirty="0"/>
               <a:t>MANNSCAHFT</a:t>
             </a:r>
           </a:p>
@@ -13927,40 +13917,39 @@
               <a:buNone/>
             </a:pPr>
             <a:r>
-              <a:rPr lang="en-US" dirty="0" smtClean="0"/>
+              <a:rPr lang="en-US" dirty="0"/>
               <a:t>  GROUP MEMBERS</a:t>
             </a:r>
           </a:p>
           <a:p>
             <a:r>
-              <a:rPr lang="en-US" dirty="0" smtClean="0"/>
+              <a:rPr lang="en-US" dirty="0"/>
               <a:t>SARAH ABOAGYE MENSAH</a:t>
             </a:r>
           </a:p>
           <a:p>
             <a:r>
-              <a:rPr lang="en-US" dirty="0" smtClean="0"/>
+              <a:rPr lang="en-US" dirty="0"/>
               <a:t>KWAKU SARPONG MANU</a:t>
             </a:r>
           </a:p>
           <a:p>
             <a:r>
-              <a:rPr lang="en-US" dirty="0" smtClean="0"/>
+              <a:rPr lang="en-US" dirty="0"/>
               <a:t>HASSA MAAZ</a:t>
             </a:r>
           </a:p>
           <a:p>
             <a:r>
-              <a:rPr lang="en-US" dirty="0" smtClean="0"/>
+              <a:rPr lang="en-US" dirty="0"/>
               <a:t>JAMAL ISSAH</a:t>
             </a:r>
           </a:p>
           <a:p>
             <a:r>
-              <a:rPr lang="en-US" dirty="0" smtClean="0"/>
+              <a:rPr lang="en-US" dirty="0"/>
               <a:t>CYRIL YAMOAH</a:t>
             </a:r>
-            <a:endParaRPr lang="en-US" dirty="0"/>
           </a:p>
         </p:txBody>
       </p:sp>
@@ -14010,10 +13999,9 @@
           <a:lstStyle/>
           <a:p>
             <a:r>
-              <a:rPr lang="en-US" b="1" dirty="0" smtClean="0"/>
+              <a:rPr lang="en-US" b="1" dirty="0"/>
               <a:t>Outline</a:t>
             </a:r>
-            <a:endParaRPr lang="en-US" b="1" dirty="0"/>
           </a:p>
         </p:txBody>
       </p:sp>
@@ -14035,48 +14023,44 @@
             <a:pPr marL="0" indent="0">
               <a:buNone/>
             </a:pPr>
-            <a:endParaRPr lang="en-US" dirty="0" smtClean="0"/>
-          </a:p>
-          <a:p>
-            <a:r>
-              <a:rPr lang="en-US" dirty="0" smtClean="0"/>
+            <a:endParaRPr lang="en-US" dirty="0"/>
+          </a:p>
+          <a:p>
+            <a:r>
+              <a:rPr lang="en-US" dirty="0"/>
               <a:t>Introduction</a:t>
             </a:r>
           </a:p>
           <a:p>
             <a:r>
-              <a:rPr lang="en-US" dirty="0" smtClean="0"/>
+              <a:rPr lang="en-US" dirty="0"/>
               <a:t>Problem statement</a:t>
             </a:r>
           </a:p>
           <a:p>
             <a:r>
-              <a:rPr lang="en-US" dirty="0" smtClean="0"/>
+              <a:rPr lang="en-US" dirty="0"/>
               <a:t>Proposed solution</a:t>
             </a:r>
           </a:p>
           <a:p>
             <a:r>
-              <a:rPr lang="en-US" dirty="0" smtClean="0"/>
+              <a:rPr lang="en-US" dirty="0"/>
               <a:t>Design specifications</a:t>
             </a:r>
           </a:p>
           <a:p>
             <a:r>
-              <a:rPr lang="en-US" dirty="0" smtClean="0"/>
+              <a:rPr lang="en-US" dirty="0"/>
               <a:t>Architecture and Functionality</a:t>
             </a:r>
           </a:p>
           <a:p>
             <a:r>
-              <a:rPr lang="en-US" smtClean="0"/>
-              <a:t>Desired </a:t>
-            </a:r>
-            <a:r>
-              <a:rPr lang="en-US" smtClean="0"/>
-              <a:t>outcome</a:t>
-            </a:r>
-            <a:endParaRPr lang="en-US" dirty="0" smtClean="0"/>
+              <a:rPr lang="en-US"/>
+              <a:t>Desired outcome</a:t>
+            </a:r>
+            <a:endParaRPr lang="en-US" dirty="0"/>
           </a:p>
           <a:p>
             <a:pPr marL="0" indent="0">
@@ -14132,10 +14116,9 @@
           <a:lstStyle/>
           <a:p>
             <a:r>
-              <a:rPr lang="en-US" b="1" dirty="0" smtClean="0"/>
+              <a:rPr lang="en-US" b="1" dirty="0"/>
               <a:t>Introduction</a:t>
             </a:r>
-            <a:endParaRPr lang="en-US" b="1" dirty="0"/>
           </a:p>
         </p:txBody>
       </p:sp>
@@ -14155,18 +14138,17 @@
           <a:lstStyle/>
           <a:p>
             <a:r>
-              <a:rPr lang="en-US" dirty="0" smtClean="0"/>
+              <a:rPr lang="en-US" dirty="0"/>
               <a:t>Electronic </a:t>
             </a:r>
             <a:r>
-              <a:rPr lang="en-US" dirty="0" err="1" smtClean="0"/>
+              <a:rPr lang="en-US" dirty="0" err="1"/>
               <a:t>Classrep</a:t>
             </a:r>
             <a:r>
-              <a:rPr lang="en-US" dirty="0" smtClean="0"/>
+              <a:rPr lang="en-US" dirty="0"/>
               <a:t> project seeks to ease both lecturers and students from difficulties in sharing and delays information about the details of a particular course.</a:t>
             </a:r>
-            <a:endParaRPr lang="en-US" dirty="0"/>
           </a:p>
         </p:txBody>
       </p:sp>
@@ -14216,10 +14198,9 @@
           <a:lstStyle/>
           <a:p>
             <a:r>
-              <a:rPr lang="en-US" b="1" dirty="0" smtClean="0"/>
+              <a:rPr lang="en-US" b="1" dirty="0"/>
               <a:t>Problem statement</a:t>
             </a:r>
-            <a:endParaRPr lang="en-US" b="1" dirty="0"/>
           </a:p>
         </p:txBody>
       </p:sp>
@@ -14239,51 +14220,51 @@
           <a:lstStyle/>
           <a:p>
             <a:r>
-              <a:rPr lang="en-US" dirty="0" smtClean="0"/>
+              <a:rPr lang="en-US" dirty="0"/>
               <a:t>Lecture – students communication challenges</a:t>
             </a:r>
           </a:p>
           <a:p>
             <a:r>
-              <a:rPr lang="en-US" dirty="0" smtClean="0"/>
+              <a:rPr lang="en-US" dirty="0"/>
               <a:t>Difficulty in resolving lecture timing conflict</a:t>
             </a:r>
           </a:p>
           <a:p>
             <a:r>
-              <a:rPr lang="en-US" dirty="0" smtClean="0"/>
+              <a:rPr lang="en-US" dirty="0"/>
               <a:t>Venue conflicts</a:t>
             </a:r>
           </a:p>
           <a:p>
             <a:r>
-              <a:rPr lang="en-US" dirty="0" smtClean="0"/>
+              <a:rPr lang="en-US" dirty="0"/>
               <a:t>Untimely distribution of course materials</a:t>
             </a:r>
           </a:p>
           <a:p>
             <a:r>
-              <a:rPr lang="en-US" dirty="0" smtClean="0"/>
+              <a:rPr lang="en-US" dirty="0"/>
               <a:t>Human  error</a:t>
             </a:r>
           </a:p>
           <a:p>
             <a:r>
-              <a:rPr lang="en-US" dirty="0" smtClean="0"/>
+              <a:rPr lang="en-US" dirty="0"/>
               <a:t>Weak class involvement in decision making</a:t>
             </a:r>
           </a:p>
           <a:p>
-            <a:endParaRPr lang="en-US" dirty="0" smtClean="0"/>
-          </a:p>
-          <a:p>
-            <a:endParaRPr lang="en-US" dirty="0" smtClean="0"/>
-          </a:p>
-          <a:p>
-            <a:endParaRPr lang="en-US" dirty="0" smtClean="0"/>
-          </a:p>
-          <a:p>
-            <a:endParaRPr lang="en-US" dirty="0" smtClean="0"/>
+            <a:endParaRPr lang="en-US" dirty="0"/>
+          </a:p>
+          <a:p>
+            <a:endParaRPr lang="en-US" dirty="0"/>
+          </a:p>
+          <a:p>
+            <a:endParaRPr lang="en-US" dirty="0"/>
+          </a:p>
+          <a:p>
+            <a:endParaRPr lang="en-US" dirty="0"/>
           </a:p>
           <a:p>
             <a:endParaRPr lang="en-US" dirty="0"/>
@@ -14336,10 +14317,9 @@
           <a:lstStyle/>
           <a:p>
             <a:r>
-              <a:rPr lang="en-US" b="1" dirty="0" smtClean="0"/>
+              <a:rPr lang="en-US" b="1" dirty="0"/>
               <a:t>Proposed Solution</a:t>
             </a:r>
-            <a:endParaRPr lang="en-US" b="1" dirty="0"/>
           </a:p>
         </p:txBody>
       </p:sp>
@@ -14364,47 +14344,37 @@
               <a:buNone/>
             </a:pPr>
             <a:r>
-              <a:rPr lang="en-US" b="1" dirty="0" smtClean="0"/>
-              <a:t> An app </a:t>
-            </a:r>
-            <a:r>
-              <a:rPr lang="en-US" b="1" dirty="0" smtClean="0"/>
-              <a:t>(Android, Web app) to</a:t>
-            </a:r>
-            <a:r>
-              <a:rPr lang="en-US" b="1" dirty="0" smtClean="0"/>
-              <a:t>:</a:t>
+              <a:rPr lang="en-US" b="1" dirty="0"/>
+              <a:t> An app (Android, Web app) to:</a:t>
             </a:r>
           </a:p>
           <a:p>
             <a:pPr lvl="0"/>
             <a:r>
-              <a:rPr lang="en-US" dirty="0" smtClean="0"/>
+              <a:rPr lang="en-US" dirty="0"/>
               <a:t>Interface lecturers and students</a:t>
             </a:r>
           </a:p>
           <a:p>
             <a:pPr lvl="0"/>
             <a:r>
-              <a:rPr lang="en-US" dirty="0" smtClean="0"/>
+              <a:rPr lang="en-US" dirty="0"/>
               <a:t> Provide a live timetable update</a:t>
             </a:r>
           </a:p>
           <a:p>
             <a:pPr lvl="0"/>
             <a:r>
-              <a:rPr lang="en-US" dirty="0" smtClean="0"/>
+              <a:rPr lang="en-US" dirty="0"/>
               <a:t>Increase class participation in decision making</a:t>
             </a:r>
-            <a:endParaRPr lang="en-US" dirty="0"/>
           </a:p>
           <a:p>
             <a:pPr lvl="0"/>
             <a:r>
-              <a:rPr lang="en-US" dirty="0" smtClean="0"/>
+              <a:rPr lang="en-US" dirty="0"/>
               <a:t>Provide effective channel for course material distribution </a:t>
             </a:r>
-            <a:endParaRPr lang="en-US" dirty="0"/>
           </a:p>
           <a:p>
             <a:endParaRPr lang="en-US" dirty="0"/>
@@ -14457,10 +14427,9 @@
           <a:lstStyle/>
           <a:p>
             <a:r>
-              <a:rPr lang="en-US" b="1" dirty="0" smtClean="0"/>
+              <a:rPr lang="en-US" b="1" dirty="0"/>
               <a:t>Design Specifications</a:t>
             </a:r>
-            <a:endParaRPr lang="en-US" b="1" dirty="0"/>
           </a:p>
         </p:txBody>
       </p:sp>
@@ -14487,25 +14456,25 @@
           <a:lstStyle/>
           <a:p>
             <a:r>
-              <a:rPr lang="en-US" dirty="0" smtClean="0"/>
+              <a:rPr lang="en-US" dirty="0"/>
               <a:t>User profiles</a:t>
             </a:r>
           </a:p>
           <a:p>
             <a:r>
-              <a:rPr lang="en-US" dirty="0" smtClean="0"/>
+              <a:rPr lang="en-US" dirty="0"/>
               <a:t>Bulletin boards for each course (with file sharing capabilities)</a:t>
             </a:r>
           </a:p>
           <a:p>
             <a:r>
-              <a:rPr lang="en-US" dirty="0" smtClean="0"/>
+              <a:rPr lang="en-US" dirty="0"/>
               <a:t>View Current Course Allocation (CCA)</a:t>
             </a:r>
           </a:p>
           <a:p>
             <a:r>
-              <a:rPr lang="en-US" dirty="0" smtClean="0"/>
+              <a:rPr lang="en-US" dirty="0"/>
               <a:t>Reschedule courses(propose and vote) and update CCA</a:t>
             </a:r>
           </a:p>
@@ -14528,13 +14497,6 @@
   <p:clrMapOvr>
     <a:masterClrMapping/>
   </p:clrMapOvr>
-  <p:timing>
-    <p:tnLst>
-      <p:par>
-        <p:cTn id="1" dur="indefinite" restart="never" nodeType="tmRoot"/>
-      </p:par>
-    </p:tnLst>
-  </p:timing>
 </p:sld>
 </file>
 
@@ -14571,10 +14533,9 @@
           <a:lstStyle/>
           <a:p>
             <a:r>
-              <a:rPr lang="en-US" b="1" dirty="0" smtClean="0"/>
+              <a:rPr lang="en-US" b="1" dirty="0"/>
               <a:t>Architecture and Functionality</a:t>
             </a:r>
-            <a:endParaRPr lang="en-US" b="1" dirty="0"/>
           </a:p>
         </p:txBody>
       </p:sp>
@@ -14593,7 +14554,7 @@
           <a:bodyPr/>
           <a:lstStyle/>
           <a:p>
-            <a:endParaRPr lang="en-US" dirty="0" smtClean="0"/>
+            <a:endParaRPr lang="en-US" dirty="0"/>
           </a:p>
           <a:p>
             <a:pPr marL="0" indent="0">
@@ -14614,7 +14575,7 @@
         <p:spPr>
           <a:xfrm>
             <a:off x="1307354" y="2755900"/>
-            <a:ext cx="8825659" cy="3416300"/>
+            <a:ext cx="8825659" cy="3702050"/>
           </a:xfrm>
           <a:prstGeom prst="rect">
             <a:avLst/>
@@ -14622,7 +14583,7 @@
         </p:spPr>
         <p:txBody>
           <a:bodyPr vert="horz" lIns="91440" tIns="45720" rIns="91440" bIns="45720" rtlCol="0">
-            <a:normAutofit/>
+            <a:normAutofit lnSpcReduction="10000"/>
           </a:bodyPr>
           <a:lstStyle>
             <a:lvl1pPr marL="342900" indent="-342900" algn="l" defTabSz="457200" rtl="0" eaLnBrk="1" latinLnBrk="0" hangingPunct="1">
@@ -14857,72 +14818,84 @@
               <a:buNone/>
             </a:pPr>
             <a:r>
-              <a:rPr lang="en-US" b="1" dirty="0" smtClean="0"/>
+              <a:rPr lang="en-US" b="1" dirty="0"/>
               <a:t>Front-end:</a:t>
             </a:r>
           </a:p>
           <a:p>
             <a:r>
-              <a:rPr lang="en-US" dirty="0" smtClean="0"/>
+              <a:rPr lang="en-US" dirty="0"/>
               <a:t>User authentication and privilege designation.</a:t>
             </a:r>
           </a:p>
           <a:p>
             <a:r>
-              <a:rPr lang="en-US" dirty="0" smtClean="0"/>
+              <a:rPr lang="en-US" dirty="0"/>
               <a:t>Features and viewable bulleting boards are designated according to user attributes (</a:t>
             </a:r>
             <a:r>
-              <a:rPr lang="en-US" dirty="0" err="1" smtClean="0"/>
+              <a:rPr lang="en-US" dirty="0" err="1"/>
               <a:t>i.e</a:t>
             </a:r>
             <a:r>
-              <a:rPr lang="en-US" dirty="0" smtClean="0"/>
+              <a:rPr lang="en-US" dirty="0"/>
               <a:t> lecture or student, year group, courses </a:t>
             </a:r>
             <a:r>
-              <a:rPr lang="en-US" dirty="0" err="1" smtClean="0"/>
+              <a:rPr lang="en-US" dirty="0" err="1"/>
               <a:t>etc</a:t>
             </a:r>
             <a:r>
-              <a:rPr lang="en-US" dirty="0" smtClean="0"/>
+              <a:rPr lang="en-US" dirty="0"/>
               <a:t>).</a:t>
             </a:r>
           </a:p>
           <a:p>
+            <a:r>
+              <a:rPr lang="en-US" dirty="0"/>
+              <a:t>Android and </a:t>
+            </a:r>
+            <a:r>
+              <a:rPr lang="en-US" dirty="0" err="1"/>
+              <a:t>webapp</a:t>
+            </a:r>
+            <a:r>
+              <a:rPr lang="en-US" dirty="0"/>
+              <a:t> (react)</a:t>
+            </a:r>
+          </a:p>
+          <a:p>
             <a:pPr marL="0" indent="0">
               <a:buNone/>
             </a:pPr>
             <a:r>
-              <a:rPr lang="en-US" b="1" dirty="0" smtClean="0"/>
+              <a:rPr lang="en-US" b="1" dirty="0"/>
               <a:t>Back-end:</a:t>
             </a:r>
           </a:p>
           <a:p>
             <a:r>
-              <a:rPr lang="en-US" dirty="0" smtClean="0"/>
+              <a:rPr lang="en-US" dirty="0"/>
               <a:t>Relational data keeps updated information relating to users and attributes like course of study (or course being taught by lecturer) etc.</a:t>
             </a:r>
           </a:p>
           <a:p>
             <a:r>
               <a:rPr lang="en-US" dirty="0"/>
-              <a:t>Queries are made </a:t>
-            </a:r>
-            <a:r>
-              <a:rPr lang="en-US" dirty="0" smtClean="0"/>
-              <a:t>by back-end application on behalf of front end requests.</a:t>
-            </a:r>
+              <a:t>Queries are made by back-end application on behalf of front end requests.</a:t>
+            </a:r>
+          </a:p>
+          <a:p>
+            <a:r>
+              <a:rPr lang="en-US" dirty="0"/>
+              <a:t>Node/SQL database</a:t>
+            </a:r>
+          </a:p>
+          <a:p>
             <a:endParaRPr lang="en-US" dirty="0"/>
           </a:p>
           <a:p>
             <a:endParaRPr lang="en-US" dirty="0"/>
-          </a:p>
-          <a:p>
-            <a:pPr marL="0" indent="0">
-              <a:buNone/>
-            </a:pPr>
-            <a:endParaRPr lang="en-US" b="1" dirty="0" smtClean="0"/>
           </a:p>
           <a:p>
             <a:pPr marL="0" indent="0">
@@ -14934,13 +14907,19 @@
             <a:pPr marL="0" indent="0">
               <a:buNone/>
             </a:pPr>
-            <a:endParaRPr lang="en-US" dirty="0" smtClean="0"/>
+            <a:endParaRPr lang="en-US" b="1" dirty="0"/>
           </a:p>
           <a:p>
             <a:pPr marL="0" indent="0">
               <a:buNone/>
             </a:pPr>
-            <a:endParaRPr lang="en-US" dirty="0" smtClean="0"/>
+            <a:endParaRPr lang="en-US" dirty="0"/>
+          </a:p>
+          <a:p>
+            <a:pPr marL="0" indent="0">
+              <a:buNone/>
+            </a:pPr>
+            <a:endParaRPr lang="en-US" dirty="0"/>
           </a:p>
         </p:txBody>
       </p:sp>
@@ -15021,8 +15000,8 @@
         </p:blipFill>
         <p:spPr>
           <a:xfrm>
-            <a:off x="1089060" y="2620917"/>
-            <a:ext cx="1921668" cy="3416300"/>
+            <a:off x="48929" y="2620916"/>
+            <a:ext cx="2331170" cy="4144303"/>
           </a:xfrm>
         </p:spPr>
       </p:pic>
@@ -15048,8 +15027,8 @@
         </p:blipFill>
         <p:spPr>
           <a:xfrm>
-            <a:off x="3019437" y="2620916"/>
-            <a:ext cx="2065973" cy="3416301"/>
+            <a:off x="2425077" y="2620916"/>
+            <a:ext cx="2506226" cy="4144304"/>
           </a:xfrm>
           <a:prstGeom prst="rect">
             <a:avLst/>
@@ -15078,8 +15057,8 @@
         </p:blipFill>
         <p:spPr>
           <a:xfrm>
-            <a:off x="5111537" y="2620916"/>
-            <a:ext cx="1921669" cy="3416301"/>
+            <a:off x="4997236" y="2620916"/>
+            <a:ext cx="2331171" cy="4144304"/>
           </a:xfrm>
           <a:prstGeom prst="rect">
             <a:avLst/>
@@ -15108,10 +15087,9 @@
           <a:lstStyle/>
           <a:p>
             <a:r>
-              <a:rPr lang="en-GB" dirty="0" smtClean="0"/>
+              <a:rPr lang="en-GB" dirty="0"/>
               <a:t>Instructor:</a:t>
             </a:r>
-            <a:endParaRPr lang="en-GB" dirty="0"/>
           </a:p>
         </p:txBody>
       </p:sp>
@@ -15137,8 +15115,8 @@
         </p:blipFill>
         <p:spPr>
           <a:xfrm>
-            <a:off x="7059333" y="2620916"/>
-            <a:ext cx="1910498" cy="3396441"/>
+            <a:off x="7367943" y="2620915"/>
+            <a:ext cx="2317618" cy="4120211"/>
           </a:xfrm>
           <a:prstGeom prst="rect">
             <a:avLst/>
@@ -15167,8 +15145,8 @@
         </p:blipFill>
         <p:spPr>
           <a:xfrm>
-            <a:off x="8995959" y="2620916"/>
-            <a:ext cx="1921670" cy="3416301"/>
+            <a:off x="9761768" y="2620916"/>
+            <a:ext cx="2331172" cy="4144304"/>
           </a:xfrm>
           <a:prstGeom prst="rect">
             <a:avLst/>

</xml_diff>